<commit_message>
Added example with third party libraries and Extract text plugin.
</commit_message>
<xml_diff>
--- a/webpack/WebPack.pptx
+++ b/webpack/WebPack.pptx
@@ -8,6 +8,10 @@
     <p:sldId id="256" r:id="rId2"/>
     <p:sldId id="257" r:id="rId3"/>
     <p:sldId id="258" r:id="rId4"/>
+    <p:sldId id="260" r:id="rId5"/>
+    <p:sldId id="261" r:id="rId6"/>
+    <p:sldId id="262" r:id="rId7"/>
+    <p:sldId id="259" r:id="rId8"/>
   </p:sldIdLst>
   <p:sldSz cx="12192000" cy="6858000"/>
   <p:notesSz cx="6858000" cy="9144000"/>
@@ -983,16 +987,37 @@
     </dgm:pt>
     <dgm:pt modelId="{4390D5D3-6FCD-4939-ACDC-BDE5D1BA67BF}">
       <dgm:prSet phldrT="[Text]"/>
-      <dgm:spPr/>
+      <dgm:spPr>
+        <a:blipFill rotWithShape="0">
+          <a:blip xmlns:r="http://schemas.openxmlformats.org/officeDocument/2006/relationships" r:embed="rId1"/>
+          <a:stretch>
+            <a:fillRect/>
+          </a:stretch>
+        </a:blipFill>
+      </dgm:spPr>
       <dgm:t>
         <a:bodyPr/>
         <a:lstStyle/>
         <a:p>
           <a:r>
-            <a:rPr lang="pl-PL" dirty="0" smtClean="0"/>
+            <a:rPr lang="pl-PL" dirty="0" smtClean="0">
+              <a:solidFill>
+                <a:schemeClr val="accent1">
+                  <a:lumMod val="40000"/>
+                  <a:lumOff val="60000"/>
+                </a:schemeClr>
+              </a:solidFill>
+            </a:rPr>
             <a:t>bundle</a:t>
           </a:r>
-          <a:endParaRPr lang="en-US" dirty="0"/>
+          <a:endParaRPr lang="en-US" dirty="0">
+            <a:solidFill>
+              <a:schemeClr val="accent1">
+                <a:lumMod val="40000"/>
+                <a:lumOff val="60000"/>
+              </a:schemeClr>
+            </a:solidFill>
+          </a:endParaRPr>
         </a:p>
       </dgm:t>
     </dgm:pt>
@@ -1036,7 +1061,7 @@
       <dgm:spPr/>
     </dgm:pt>
     <dgm:pt modelId="{D4589940-146E-4EF4-AAE7-883D2C09A054}" type="pres">
-      <dgm:prSet presAssocID="{2E52D7F6-851A-437D-8D8C-3504A81AF1A6}" presName="rectangle" presStyleLbl="revTx" presStyleIdx="0" presStyleCnt="1">
+      <dgm:prSet presAssocID="{2E52D7F6-851A-437D-8D8C-3504A81AF1A6}" presName="rectangle" presStyleLbl="revTx" presStyleIdx="0" presStyleCnt="1" custScaleX="80976" custScaleY="140558" custLinFactNeighborX="2442" custLinFactNeighborY="69739">
         <dgm:presLayoutVars>
           <dgm:bulletEnabled val="1"/>
         </dgm:presLayoutVars>
@@ -1136,8 +1161,8 @@
       </dsp:nvSpPr>
       <dsp:spPr>
         <a:xfrm>
-          <a:off x="862480" y="146010"/>
-          <a:ext cx="2897743" cy="1006348"/>
+          <a:off x="856880" y="565168"/>
+          <a:ext cx="3131375" cy="1087485"/>
         </a:xfrm>
         <a:prstGeom prst="ellipse">
           <a:avLst/>
@@ -1177,8 +1202,8 @@
       </dsp:nvSpPr>
       <dsp:spPr>
         <a:xfrm>
-          <a:off x="2035055" y="2610215"/>
-          <a:ext cx="561578" cy="359410"/>
+          <a:off x="2123995" y="3228051"/>
+          <a:ext cx="606855" cy="388387"/>
         </a:xfrm>
         <a:prstGeom prst="downArrow">
           <a:avLst/>
@@ -1225,13 +1250,18 @@
       </dsp:nvSpPr>
       <dsp:spPr>
         <a:xfrm>
-          <a:off x="968057" y="2897743"/>
-          <a:ext cx="2695575" cy="673893"/>
+          <a:off x="1319178" y="3822744"/>
+          <a:ext cx="2358756" cy="1023581"/>
         </a:xfrm>
         <a:prstGeom prst="rect">
           <a:avLst/>
         </a:prstGeom>
-        <a:noFill/>
+        <a:blipFill rotWithShape="0">
+          <a:blip xmlns:r="http://schemas.openxmlformats.org/officeDocument/2006/relationships" r:embed="rId1"/>
+          <a:stretch>
+            <a:fillRect/>
+          </a:stretch>
+        </a:blipFill>
         <a:ln>
           <a:noFill/>
         </a:ln>
@@ -1250,12 +1280,12 @@
         <a:fontRef idx="minor"/>
       </dsp:style>
       <dsp:txBody>
-        <a:bodyPr spcFirstLastPara="0" vert="horz" wrap="square" lIns="170688" tIns="170688" rIns="170688" bIns="170688" numCol="1" spcCol="1270" anchor="ctr" anchorCtr="0">
+        <a:bodyPr spcFirstLastPara="0" vert="horz" wrap="square" lIns="263144" tIns="263144" rIns="263144" bIns="263144" numCol="1" spcCol="1270" anchor="ctr" anchorCtr="0">
           <a:noAutofit/>
         </a:bodyPr>
         <a:lstStyle/>
         <a:p>
-          <a:pPr lvl="0" algn="ctr" defTabSz="1066800">
+          <a:pPr lvl="0" algn="ctr" defTabSz="1644650">
             <a:lnSpc>
               <a:spcPct val="90000"/>
             </a:lnSpc>
@@ -1267,15 +1297,29 @@
             </a:spcAft>
           </a:pPr>
           <a:r>
-            <a:rPr lang="pl-PL" sz="2400" kern="1200" dirty="0" smtClean="0"/>
+            <a:rPr lang="pl-PL" sz="3700" kern="1200" dirty="0" smtClean="0">
+              <a:solidFill>
+                <a:schemeClr val="accent1">
+                  <a:lumMod val="40000"/>
+                  <a:lumOff val="60000"/>
+                </a:schemeClr>
+              </a:solidFill>
+            </a:rPr>
             <a:t>bundle</a:t>
           </a:r>
-          <a:endParaRPr lang="en-US" sz="2400" kern="1200" dirty="0"/>
+          <a:endParaRPr lang="en-US" sz="3700" kern="1200" dirty="0">
+            <a:solidFill>
+              <a:schemeClr val="accent1">
+                <a:lumMod val="40000"/>
+                <a:lumOff val="60000"/>
+              </a:schemeClr>
+            </a:solidFill>
+          </a:endParaRPr>
         </a:p>
       </dsp:txBody>
       <dsp:txXfrm>
-        <a:off x="968057" y="2897743"/>
-        <a:ext cx="2695575" cy="673893"/>
+        <a:off x="1319178" y="3822744"/>
+        <a:ext cx="2358756" cy="1023581"/>
       </dsp:txXfrm>
     </dsp:sp>
     <dsp:sp modelId="{587C2834-2EE5-4FE1-8B49-802B6EDED197}">
@@ -1285,8 +1329,8 @@
       </dsp:nvSpPr>
       <dsp:spPr>
         <a:xfrm>
-          <a:off x="1916001" y="1230080"/>
-          <a:ext cx="1010840" cy="1010840"/>
+          <a:off x="1995341" y="1736642"/>
+          <a:ext cx="1092340" cy="1092340"/>
         </a:xfrm>
         <a:prstGeom prst="ellipse">
           <a:avLst/>
@@ -1327,12 +1371,12 @@
         </a:fontRef>
       </dsp:style>
       <dsp:txBody>
-        <a:bodyPr spcFirstLastPara="0" vert="horz" wrap="square" lIns="15240" tIns="15240" rIns="15240" bIns="15240" numCol="1" spcCol="1270" anchor="ctr" anchorCtr="0">
+        <a:bodyPr spcFirstLastPara="0" vert="horz" wrap="square" lIns="16510" tIns="16510" rIns="16510" bIns="16510" numCol="1" spcCol="1270" anchor="ctr" anchorCtr="0">
           <a:noAutofit/>
         </a:bodyPr>
         <a:lstStyle/>
         <a:p>
-          <a:pPr lvl="0" algn="ctr" defTabSz="533400">
+          <a:pPr lvl="0" algn="ctr" defTabSz="577850">
             <a:lnSpc>
               <a:spcPct val="90000"/>
             </a:lnSpc>
@@ -1344,15 +1388,15 @@
             </a:spcAft>
           </a:pPr>
           <a:r>
-            <a:rPr lang="pl-PL" sz="1200" kern="1200" dirty="0" smtClean="0"/>
+            <a:rPr lang="pl-PL" sz="1300" kern="1200" dirty="0" smtClean="0"/>
             <a:t>css</a:t>
           </a:r>
-          <a:endParaRPr lang="en-US" sz="1200" kern="1200" dirty="0"/>
+          <a:endParaRPr lang="en-US" sz="1300" kern="1200" dirty="0"/>
         </a:p>
       </dsp:txBody>
       <dsp:txXfrm>
-        <a:off x="2064035" y="1378114"/>
-        <a:ext cx="714772" cy="714772"/>
+        <a:off x="2155310" y="1896611"/>
+        <a:ext cx="772402" cy="772402"/>
       </dsp:txXfrm>
     </dsp:sp>
     <dsp:sp modelId="{FAF47A9A-1EB7-4A6E-83F9-284F142791B1}">
@@ -1362,8 +1406,8 @@
       </dsp:nvSpPr>
       <dsp:spPr>
         <a:xfrm>
-          <a:off x="1192688" y="471725"/>
-          <a:ext cx="1010840" cy="1010840"/>
+          <a:off x="1213711" y="917144"/>
+          <a:ext cx="1092340" cy="1092340"/>
         </a:xfrm>
         <a:prstGeom prst="ellipse">
           <a:avLst/>
@@ -1404,12 +1448,12 @@
         </a:fontRef>
       </dsp:style>
       <dsp:txBody>
-        <a:bodyPr spcFirstLastPara="0" vert="horz" wrap="square" lIns="15240" tIns="15240" rIns="15240" bIns="15240" numCol="1" spcCol="1270" anchor="ctr" anchorCtr="0">
+        <a:bodyPr spcFirstLastPara="0" vert="horz" wrap="square" lIns="16510" tIns="16510" rIns="16510" bIns="16510" numCol="1" spcCol="1270" anchor="ctr" anchorCtr="0">
           <a:noAutofit/>
         </a:bodyPr>
         <a:lstStyle/>
         <a:p>
-          <a:pPr lvl="0" algn="ctr" defTabSz="533400">
+          <a:pPr lvl="0" algn="ctr" defTabSz="577850">
             <a:lnSpc>
               <a:spcPct val="90000"/>
             </a:lnSpc>
@@ -1421,15 +1465,15 @@
             </a:spcAft>
           </a:pPr>
           <a:r>
-            <a:rPr lang="pl-PL" sz="1200" kern="1200" dirty="0" smtClean="0"/>
+            <a:rPr lang="pl-PL" sz="1300" kern="1200" dirty="0" smtClean="0"/>
             <a:t>javascript</a:t>
           </a:r>
-          <a:endParaRPr lang="en-US" sz="1200" kern="1200" dirty="0"/>
+          <a:endParaRPr lang="en-US" sz="1300" kern="1200" dirty="0"/>
         </a:p>
       </dsp:txBody>
       <dsp:txXfrm>
-        <a:off x="1340722" y="619759"/>
-        <a:ext cx="714772" cy="714772"/>
+        <a:off x="1373680" y="1077113"/>
+        <a:ext cx="772402" cy="772402"/>
       </dsp:txXfrm>
     </dsp:sp>
     <dsp:sp modelId="{6DDF66CD-0C2B-4205-8C71-B3739785D8FB}">
@@ -1439,8 +1483,8 @@
       </dsp:nvSpPr>
       <dsp:spPr>
         <a:xfrm>
-          <a:off x="2225992" y="227326"/>
-          <a:ext cx="1010840" cy="1010840"/>
+          <a:off x="2330326" y="653041"/>
+          <a:ext cx="1092340" cy="1092340"/>
         </a:xfrm>
         <a:prstGeom prst="ellipse">
           <a:avLst/>
@@ -1481,12 +1525,12 @@
         </a:fontRef>
       </dsp:style>
       <dsp:txBody>
-        <a:bodyPr spcFirstLastPara="0" vert="horz" wrap="square" lIns="15240" tIns="15240" rIns="15240" bIns="15240" numCol="1" spcCol="1270" anchor="ctr" anchorCtr="0">
+        <a:bodyPr spcFirstLastPara="0" vert="horz" wrap="square" lIns="16510" tIns="16510" rIns="16510" bIns="16510" numCol="1" spcCol="1270" anchor="ctr" anchorCtr="0">
           <a:noAutofit/>
         </a:bodyPr>
         <a:lstStyle/>
         <a:p>
-          <a:pPr lvl="0" algn="ctr" defTabSz="533400">
+          <a:pPr lvl="0" algn="ctr" defTabSz="577850">
             <a:lnSpc>
               <a:spcPct val="90000"/>
             </a:lnSpc>
@@ -1498,15 +1542,15 @@
             </a:spcAft>
           </a:pPr>
           <a:r>
-            <a:rPr lang="pl-PL" sz="1200" kern="1200" dirty="0" smtClean="0"/>
+            <a:rPr lang="pl-PL" sz="1300" kern="1200" dirty="0" smtClean="0"/>
             <a:t>html</a:t>
           </a:r>
-          <a:endParaRPr lang="en-US" sz="1200" kern="1200" dirty="0"/>
+          <a:endParaRPr lang="en-US" sz="1300" kern="1200" dirty="0"/>
         </a:p>
       </dsp:txBody>
       <dsp:txXfrm>
-        <a:off x="2374026" y="375360"/>
-        <a:ext cx="714772" cy="714772"/>
+        <a:off x="2490295" y="813010"/>
+        <a:ext cx="772402" cy="772402"/>
       </dsp:txXfrm>
     </dsp:sp>
     <dsp:sp modelId="{6B0E0B26-1317-447B-B019-5BB868B65394}">
@@ -1516,8 +1560,8 @@
       </dsp:nvSpPr>
       <dsp:spPr>
         <a:xfrm>
-          <a:off x="743426" y="22463"/>
-          <a:ext cx="3144837" cy="2515870"/>
+          <a:off x="728226" y="431660"/>
+          <a:ext cx="3398392" cy="2718713"/>
         </a:xfrm>
         <a:prstGeom prst="funnel">
           <a:avLst/>
@@ -9608,8 +9652,12 @@
           <a:lstStyle/>
           <a:p>
             <a:r>
+              <a:rPr lang="pl-PL" dirty="0" smtClean="0"/>
+              <a:t>General</a:t>
+            </a:r>
+            <a:r>
               <a:rPr lang="en-US" dirty="0" smtClean="0"/>
-              <a:t>BASIC OVERVIEW</a:t>
+              <a:t> OVERVIEW</a:t>
             </a:r>
             <a:endParaRPr lang="en-US" dirty="0"/>
           </a:p>
@@ -9748,7 +9796,7 @@
           <a:p>
             <a:r>
               <a:rPr lang="pl-PL" dirty="0" smtClean="0"/>
-              <a:t>Dependencies</a:t>
+              <a:t>HOW DOES IT WORK?</a:t>
             </a:r>
             <a:endParaRPr lang="en-US" dirty="0"/>
           </a:p>
@@ -9764,14 +9812,14 @@
             <p:ph idx="1"/>
             <p:extLst>
               <p:ext uri="{D42A27DB-BD31-4B8C-83A1-F6EECF244321}">
-                <p14:modId xmlns:p14="http://schemas.microsoft.com/office/powerpoint/2010/main" val="1613033229"/>
+                <p14:modId xmlns:p14="http://schemas.microsoft.com/office/powerpoint/2010/main" val="763013768"/>
               </p:ext>
             </p:extLst>
           </p:nvPr>
         </p:nvGraphicFramePr>
         <p:xfrm>
-          <a:off x="1586230" y="1910074"/>
-          <a:ext cx="4631690" cy="3594100"/>
+          <a:off x="3547474" y="1219194"/>
+          <a:ext cx="4854846" cy="4846326"/>
         </p:xfrm>
         <a:graphic>
           <a:graphicData uri="http://schemas.openxmlformats.org/drawingml/2006/diagram">
@@ -9783,6 +9831,645 @@
     <p:extLst>
       <p:ext uri="{BB962C8B-B14F-4D97-AF65-F5344CB8AC3E}">
         <p14:creationId xmlns:p14="http://schemas.microsoft.com/office/powerpoint/2010/main" val="2889320940"/>
+      </p:ext>
+    </p:extLst>
+  </p:cSld>
+  <p:clrMapOvr>
+    <a:masterClrMapping/>
+  </p:clrMapOvr>
+</p:sld>
+</file>
+
+<file path=ppt/slides/slide4.xml><?xml version="1.0" encoding="utf-8"?>
+<p:sld xmlns:a="http://schemas.openxmlformats.org/drawingml/2006/main" xmlns:r="http://schemas.openxmlformats.org/officeDocument/2006/relationships" xmlns:p="http://schemas.openxmlformats.org/presentationml/2006/main">
+  <p:cSld>
+    <p:spTree>
+      <p:nvGrpSpPr>
+        <p:cNvPr id="1" name=""/>
+        <p:cNvGrpSpPr/>
+        <p:nvPr/>
+      </p:nvGrpSpPr>
+      <p:grpSpPr>
+        <a:xfrm>
+          <a:off x="0" y="0"/>
+          <a:ext cx="0" cy="0"/>
+          <a:chOff x="0" y="0"/>
+          <a:chExt cx="0" cy="0"/>
+        </a:xfrm>
+      </p:grpSpPr>
+      <p:sp>
+        <p:nvSpPr>
+          <p:cNvPr id="2" name="Title 1"/>
+          <p:cNvSpPr>
+            <a:spLocks noGrp="1"/>
+          </p:cNvSpPr>
+          <p:nvPr>
+            <p:ph type="title"/>
+          </p:nvPr>
+        </p:nvSpPr>
+        <p:spPr/>
+        <p:txBody>
+          <a:bodyPr/>
+          <a:lstStyle/>
+          <a:p>
+            <a:r>
+              <a:rPr lang="en-US" dirty="0" smtClean="0"/>
+              <a:t>Module FORMATS</a:t>
+            </a:r>
+            <a:endParaRPr lang="en-US" dirty="0"/>
+          </a:p>
+        </p:txBody>
+      </p:sp>
+      <p:sp>
+        <p:nvSpPr>
+          <p:cNvPr id="3" name="Content Placeholder 2"/>
+          <p:cNvSpPr>
+            <a:spLocks noGrp="1"/>
+          </p:cNvSpPr>
+          <p:nvPr>
+            <p:ph idx="1"/>
+          </p:nvPr>
+        </p:nvSpPr>
+        <p:spPr/>
+        <p:txBody>
+          <a:bodyPr/>
+          <a:lstStyle/>
+          <a:p>
+            <a:pPr>
+              <a:buFontTx/>
+              <a:buChar char="-"/>
+            </a:pPr>
+            <a:r>
+              <a:rPr lang="en-US" dirty="0" smtClean="0"/>
+              <a:t>Asynchronous </a:t>
+            </a:r>
+            <a:r>
+              <a:rPr lang="en-US" dirty="0"/>
+              <a:t>Module Definition (AMD</a:t>
+            </a:r>
+            <a:r>
+              <a:rPr lang="en-US" dirty="0" smtClean="0"/>
+              <a:t>)</a:t>
+            </a:r>
+          </a:p>
+          <a:p>
+            <a:pPr>
+              <a:buFontTx/>
+              <a:buChar char="-"/>
+            </a:pPr>
+            <a:r>
+              <a:rPr lang="en-US" dirty="0" err="1"/>
+              <a:t>CommonJS</a:t>
+            </a:r>
+            <a:endParaRPr lang="en-US" dirty="0"/>
+          </a:p>
+          <a:p>
+            <a:pPr>
+              <a:buFontTx/>
+              <a:buChar char="-"/>
+            </a:pPr>
+            <a:r>
+              <a:rPr lang="en-US" dirty="0"/>
+              <a:t>Universal Module Definition (UMD</a:t>
+            </a:r>
+            <a:r>
+              <a:rPr lang="en-US" dirty="0" smtClean="0"/>
+              <a:t>)</a:t>
+            </a:r>
+          </a:p>
+          <a:p>
+            <a:pPr>
+              <a:buFontTx/>
+              <a:buChar char="-"/>
+            </a:pPr>
+            <a:r>
+              <a:rPr lang="en-US" dirty="0" err="1" smtClean="0"/>
+              <a:t>System.register</a:t>
+            </a:r>
+            <a:r>
+              <a:rPr lang="en-US" dirty="0" smtClean="0"/>
+              <a:t> (ES6 modules for ES5)</a:t>
+            </a:r>
+            <a:endParaRPr lang="en-US" dirty="0"/>
+          </a:p>
+          <a:p>
+            <a:pPr>
+              <a:buFontTx/>
+              <a:buChar char="-"/>
+            </a:pPr>
+            <a:r>
+              <a:rPr lang="en-US" dirty="0" smtClean="0"/>
+              <a:t>ES6 </a:t>
+            </a:r>
+            <a:r>
+              <a:rPr lang="en-US" dirty="0"/>
+              <a:t>module </a:t>
+            </a:r>
+            <a:r>
+              <a:rPr lang="en-US" dirty="0" smtClean="0"/>
+              <a:t>format</a:t>
+            </a:r>
+          </a:p>
+          <a:p>
+            <a:pPr>
+              <a:buFontTx/>
+              <a:buChar char="-"/>
+            </a:pPr>
+            <a:r>
+              <a:rPr lang="en-US" dirty="0" err="1" smtClean="0"/>
+              <a:t>WebAssembly</a:t>
+            </a:r>
+            <a:r>
+              <a:rPr lang="en-US" dirty="0" smtClean="0"/>
+              <a:t> (</a:t>
+            </a:r>
+            <a:r>
+              <a:rPr lang="en-US" dirty="0" err="1" smtClean="0"/>
+              <a:t>Wasm</a:t>
+            </a:r>
+            <a:r>
+              <a:rPr lang="en-US" dirty="0" smtClean="0"/>
+              <a:t>) Module Format</a:t>
+            </a:r>
+            <a:endParaRPr lang="en-US" dirty="0"/>
+          </a:p>
+          <a:p>
+            <a:pPr marL="0" indent="0">
+              <a:buNone/>
+            </a:pPr>
+            <a:r>
+              <a:rPr lang="en-US" dirty="0" smtClean="0"/>
+              <a:t> </a:t>
+            </a:r>
+            <a:endParaRPr lang="en-US" dirty="0"/>
+          </a:p>
+        </p:txBody>
+      </p:sp>
+    </p:spTree>
+    <p:extLst>
+      <p:ext uri="{BB962C8B-B14F-4D97-AF65-F5344CB8AC3E}">
+        <p14:creationId xmlns:p14="http://schemas.microsoft.com/office/powerpoint/2010/main" val="721945899"/>
+      </p:ext>
+    </p:extLst>
+  </p:cSld>
+  <p:clrMapOvr>
+    <a:masterClrMapping/>
+  </p:clrMapOvr>
+</p:sld>
+</file>
+
+<file path=ppt/slides/slide5.xml><?xml version="1.0" encoding="utf-8"?>
+<p:sld xmlns:a="http://schemas.openxmlformats.org/drawingml/2006/main" xmlns:r="http://schemas.openxmlformats.org/officeDocument/2006/relationships" xmlns:p="http://schemas.openxmlformats.org/presentationml/2006/main">
+  <p:cSld>
+    <p:spTree>
+      <p:nvGrpSpPr>
+        <p:cNvPr id="1" name=""/>
+        <p:cNvGrpSpPr/>
+        <p:nvPr/>
+      </p:nvGrpSpPr>
+      <p:grpSpPr>
+        <a:xfrm>
+          <a:off x="0" y="0"/>
+          <a:ext cx="0" cy="0"/>
+          <a:chOff x="0" y="0"/>
+          <a:chExt cx="0" cy="0"/>
+        </a:xfrm>
+      </p:grpSpPr>
+      <p:sp>
+        <p:nvSpPr>
+          <p:cNvPr id="2" name="Title 1"/>
+          <p:cNvSpPr>
+            <a:spLocks noGrp="1"/>
+          </p:cNvSpPr>
+          <p:nvPr>
+            <p:ph type="title"/>
+          </p:nvPr>
+        </p:nvSpPr>
+        <p:spPr/>
+        <p:txBody>
+          <a:bodyPr/>
+          <a:lstStyle/>
+          <a:p>
+            <a:r>
+              <a:rPr lang="en-US" dirty="0" smtClean="0"/>
+              <a:t>Module </a:t>
+            </a:r>
+            <a:r>
+              <a:rPr lang="en-US" dirty="0" err="1" smtClean="0"/>
+              <a:t>LoaderS</a:t>
+            </a:r>
+            <a:endParaRPr lang="en-US" dirty="0"/>
+          </a:p>
+        </p:txBody>
+      </p:sp>
+      <p:sp>
+        <p:nvSpPr>
+          <p:cNvPr id="3" name="Content Placeholder 2"/>
+          <p:cNvSpPr>
+            <a:spLocks noGrp="1"/>
+          </p:cNvSpPr>
+          <p:nvPr>
+            <p:ph idx="1"/>
+          </p:nvPr>
+        </p:nvSpPr>
+        <p:spPr/>
+        <p:txBody>
+          <a:bodyPr/>
+          <a:lstStyle/>
+          <a:p>
+            <a:pPr marL="0" indent="0">
+              <a:buNone/>
+            </a:pPr>
+            <a:r>
+              <a:rPr lang="en-US" dirty="0" smtClean="0"/>
+              <a:t>Load required (imported) modules at run time</a:t>
+            </a:r>
+            <a:endParaRPr lang="en-US" dirty="0"/>
+          </a:p>
+        </p:txBody>
+      </p:sp>
+      <p:pic>
+        <p:nvPicPr>
+          <p:cNvPr id="4" name="Picture 3"/>
+          <p:cNvPicPr>
+            <a:picLocks noChangeAspect="1"/>
+          </p:cNvPicPr>
+          <p:nvPr/>
+        </p:nvPicPr>
+        <p:blipFill>
+          <a:blip r:embed="rId2">
+            <a:extLst>
+              <a:ext uri="{28A0092B-C50C-407E-A947-70E740481C1C}">
+                <a14:useLocalDpi xmlns:a14="http://schemas.microsoft.com/office/drawing/2010/main" val="0"/>
+              </a:ext>
+            </a:extLst>
+          </a:blip>
+          <a:stretch>
+            <a:fillRect/>
+          </a:stretch>
+        </p:blipFill>
+        <p:spPr>
+          <a:xfrm>
+            <a:off x="2372360" y="3004820"/>
+            <a:ext cx="1882140" cy="1882140"/>
+          </a:xfrm>
+          <a:prstGeom prst="rect">
+            <a:avLst/>
+          </a:prstGeom>
+        </p:spPr>
+      </p:pic>
+      <p:pic>
+        <p:nvPicPr>
+          <p:cNvPr id="5" name="Picture 4"/>
+          <p:cNvPicPr>
+            <a:picLocks noChangeAspect="1"/>
+          </p:cNvPicPr>
+          <p:nvPr/>
+        </p:nvPicPr>
+        <p:blipFill>
+          <a:blip r:embed="rId3">
+            <a:extLst>
+              <a:ext uri="{28A0092B-C50C-407E-A947-70E740481C1C}">
+                <a14:useLocalDpi xmlns:a14="http://schemas.microsoft.com/office/drawing/2010/main" val="0"/>
+              </a:ext>
+            </a:extLst>
+          </a:blip>
+          <a:stretch>
+            <a:fillRect/>
+          </a:stretch>
+        </p:blipFill>
+        <p:spPr>
+          <a:xfrm>
+            <a:off x="2703880" y="4968782"/>
+            <a:ext cx="1219099" cy="414494"/>
+          </a:xfrm>
+          <a:prstGeom prst="rect">
+            <a:avLst/>
+          </a:prstGeom>
+        </p:spPr>
+      </p:pic>
+      <p:pic>
+        <p:nvPicPr>
+          <p:cNvPr id="6" name="Picture 5"/>
+          <p:cNvPicPr>
+            <a:picLocks noChangeAspect="1"/>
+          </p:cNvPicPr>
+          <p:nvPr/>
+        </p:nvPicPr>
+        <p:blipFill>
+          <a:blip r:embed="rId4">
+            <a:extLst>
+              <a:ext uri="{28A0092B-C50C-407E-A947-70E740481C1C}">
+                <a14:useLocalDpi xmlns:a14="http://schemas.microsoft.com/office/drawing/2010/main" val="0"/>
+              </a:ext>
+            </a:extLst>
+          </a:blip>
+          <a:stretch>
+            <a:fillRect/>
+          </a:stretch>
+        </p:blipFill>
+        <p:spPr>
+          <a:xfrm>
+            <a:off x="5260831" y="3075940"/>
+            <a:ext cx="2019587" cy="2231644"/>
+          </a:xfrm>
+          <a:prstGeom prst="rect">
+            <a:avLst/>
+          </a:prstGeom>
+        </p:spPr>
+      </p:pic>
+      <p:sp>
+        <p:nvSpPr>
+          <p:cNvPr id="8" name="TextBox 7"/>
+          <p:cNvSpPr txBox="1"/>
+          <p:nvPr/>
+        </p:nvSpPr>
+        <p:spPr>
+          <a:xfrm>
+            <a:off x="8286750" y="3009138"/>
+            <a:ext cx="2184400" cy="461665"/>
+          </a:xfrm>
+          <a:prstGeom prst="rect">
+            <a:avLst/>
+          </a:prstGeom>
+          <a:noFill/>
+        </p:spPr>
+        <p:txBody>
+          <a:bodyPr wrap="square" rtlCol="0">
+            <a:spAutoFit/>
+          </a:bodyPr>
+          <a:lstStyle/>
+          <a:p>
+            <a:r>
+              <a:rPr lang="en-US" sz="2400" dirty="0" err="1" smtClean="0"/>
+              <a:t>SystemJS</a:t>
+            </a:r>
+            <a:endParaRPr lang="en-US" sz="2400" dirty="0"/>
+          </a:p>
+        </p:txBody>
+      </p:sp>
+      <p:pic>
+        <p:nvPicPr>
+          <p:cNvPr id="9" name="Picture 8"/>
+          <p:cNvPicPr>
+            <a:picLocks noChangeAspect="1"/>
+          </p:cNvPicPr>
+          <p:nvPr/>
+        </p:nvPicPr>
+        <p:blipFill>
+          <a:blip r:embed="rId5">
+            <a:extLst>
+              <a:ext uri="{28A0092B-C50C-407E-A947-70E740481C1C}">
+                <a14:useLocalDpi xmlns:a14="http://schemas.microsoft.com/office/drawing/2010/main" val="0"/>
+              </a:ext>
+            </a:extLst>
+          </a:blip>
+          <a:stretch>
+            <a:fillRect/>
+          </a:stretch>
+        </p:blipFill>
+        <p:spPr>
+          <a:xfrm flipH="1">
+            <a:off x="8286750" y="3470803"/>
+            <a:ext cx="1596390" cy="1596390"/>
+          </a:xfrm>
+          <a:prstGeom prst="rect">
+            <a:avLst/>
+          </a:prstGeom>
+        </p:spPr>
+      </p:pic>
+    </p:spTree>
+    <p:extLst>
+      <p:ext uri="{BB962C8B-B14F-4D97-AF65-F5344CB8AC3E}">
+        <p14:creationId xmlns:p14="http://schemas.microsoft.com/office/powerpoint/2010/main" val="2312101371"/>
+      </p:ext>
+    </p:extLst>
+  </p:cSld>
+  <p:clrMapOvr>
+    <a:masterClrMapping/>
+  </p:clrMapOvr>
+</p:sld>
+</file>
+
+<file path=ppt/slides/slide6.xml><?xml version="1.0" encoding="utf-8"?>
+<p:sld xmlns:a="http://schemas.openxmlformats.org/drawingml/2006/main" xmlns:r="http://schemas.openxmlformats.org/officeDocument/2006/relationships" xmlns:p="http://schemas.openxmlformats.org/presentationml/2006/main">
+  <p:cSld>
+    <p:spTree>
+      <p:nvGrpSpPr>
+        <p:cNvPr id="1" name=""/>
+        <p:cNvGrpSpPr/>
+        <p:nvPr/>
+      </p:nvGrpSpPr>
+      <p:grpSpPr>
+        <a:xfrm>
+          <a:off x="0" y="0"/>
+          <a:ext cx="0" cy="0"/>
+          <a:chOff x="0" y="0"/>
+          <a:chExt cx="0" cy="0"/>
+        </a:xfrm>
+      </p:grpSpPr>
+      <p:sp>
+        <p:nvSpPr>
+          <p:cNvPr id="2" name="Title 1"/>
+          <p:cNvSpPr>
+            <a:spLocks noGrp="1"/>
+          </p:cNvSpPr>
+          <p:nvPr>
+            <p:ph type="title"/>
+          </p:nvPr>
+        </p:nvSpPr>
+        <p:spPr/>
+        <p:txBody>
+          <a:bodyPr/>
+          <a:lstStyle/>
+          <a:p>
+            <a:r>
+              <a:rPr lang="en-US" dirty="0" smtClean="0"/>
+              <a:t>MODULE BUNDLERS</a:t>
+            </a:r>
+            <a:endParaRPr lang="en-US" dirty="0"/>
+          </a:p>
+        </p:txBody>
+      </p:sp>
+      <p:pic>
+        <p:nvPicPr>
+          <p:cNvPr id="6" name="Content Placeholder 5"/>
+          <p:cNvPicPr>
+            <a:picLocks noGrp="1" noChangeAspect="1"/>
+          </p:cNvPicPr>
+          <p:nvPr>
+            <p:ph idx="1"/>
+          </p:nvPr>
+        </p:nvPicPr>
+        <p:blipFill>
+          <a:blip r:embed="rId2">
+            <a:extLst>
+              <a:ext uri="{28A0092B-C50C-407E-A947-70E740481C1C}">
+                <a14:useLocalDpi xmlns:a14="http://schemas.microsoft.com/office/drawing/2010/main" val="0"/>
+              </a:ext>
+            </a:extLst>
+          </a:blip>
+          <a:stretch>
+            <a:fillRect/>
+          </a:stretch>
+        </p:blipFill>
+        <p:spPr>
+          <a:xfrm>
+            <a:off x="1981835" y="2982759"/>
+            <a:ext cx="3067685" cy="908802"/>
+          </a:xfrm>
+        </p:spPr>
+      </p:pic>
+      <p:pic>
+        <p:nvPicPr>
+          <p:cNvPr id="7" name="Picture 6"/>
+          <p:cNvPicPr>
+            <a:picLocks noChangeAspect="1"/>
+          </p:cNvPicPr>
+          <p:nvPr/>
+        </p:nvPicPr>
+        <p:blipFill>
+          <a:blip r:embed="rId3">
+            <a:extLst>
+              <a:ext uri="{28A0092B-C50C-407E-A947-70E740481C1C}">
+                <a14:useLocalDpi xmlns:a14="http://schemas.microsoft.com/office/drawing/2010/main" val="0"/>
+              </a:ext>
+            </a:extLst>
+          </a:blip>
+          <a:stretch>
+            <a:fillRect/>
+          </a:stretch>
+        </p:blipFill>
+        <p:spPr>
+          <a:xfrm>
+            <a:off x="4874385" y="2250944"/>
+            <a:ext cx="2932907" cy="3281233"/>
+          </a:xfrm>
+          <a:prstGeom prst="rect">
+            <a:avLst/>
+          </a:prstGeom>
+        </p:spPr>
+      </p:pic>
+      <p:pic>
+        <p:nvPicPr>
+          <p:cNvPr id="8" name="Picture 7"/>
+          <p:cNvPicPr>
+            <a:picLocks noChangeAspect="1"/>
+          </p:cNvPicPr>
+          <p:nvPr/>
+        </p:nvPicPr>
+        <p:blipFill>
+          <a:blip r:embed="rId4">
+            <a:extLst>
+              <a:ext uri="{28A0092B-C50C-407E-A947-70E740481C1C}">
+                <a14:useLocalDpi xmlns:a14="http://schemas.microsoft.com/office/drawing/2010/main" val="0"/>
+              </a:ext>
+            </a:extLst>
+          </a:blip>
+          <a:stretch>
+            <a:fillRect/>
+          </a:stretch>
+        </p:blipFill>
+        <p:spPr>
+          <a:xfrm>
+            <a:off x="7807292" y="2621280"/>
+            <a:ext cx="3391505" cy="1780540"/>
+          </a:xfrm>
+          <a:prstGeom prst="rect">
+            <a:avLst/>
+          </a:prstGeom>
+        </p:spPr>
+      </p:pic>
+    </p:spTree>
+    <p:extLst>
+      <p:ext uri="{BB962C8B-B14F-4D97-AF65-F5344CB8AC3E}">
+        <p14:creationId xmlns:p14="http://schemas.microsoft.com/office/powerpoint/2010/main" val="3354870162"/>
+      </p:ext>
+    </p:extLst>
+  </p:cSld>
+  <p:clrMapOvr>
+    <a:masterClrMapping/>
+  </p:clrMapOvr>
+</p:sld>
+</file>
+
+<file path=ppt/slides/slide7.xml><?xml version="1.0" encoding="utf-8"?>
+<p:sld xmlns:a="http://schemas.openxmlformats.org/drawingml/2006/main" xmlns:r="http://schemas.openxmlformats.org/officeDocument/2006/relationships" xmlns:p="http://schemas.openxmlformats.org/presentationml/2006/main">
+  <p:cSld>
+    <p:spTree>
+      <p:nvGrpSpPr>
+        <p:cNvPr id="1" name=""/>
+        <p:cNvGrpSpPr/>
+        <p:nvPr/>
+      </p:nvGrpSpPr>
+      <p:grpSpPr>
+        <a:xfrm>
+          <a:off x="0" y="0"/>
+          <a:ext cx="0" cy="0"/>
+          <a:chOff x="0" y="0"/>
+          <a:chExt cx="0" cy="0"/>
+        </a:xfrm>
+      </p:grpSpPr>
+      <p:sp>
+        <p:nvSpPr>
+          <p:cNvPr id="2" name="Title 1"/>
+          <p:cNvSpPr>
+            <a:spLocks noGrp="1"/>
+          </p:cNvSpPr>
+          <p:nvPr>
+            <p:ph type="title"/>
+          </p:nvPr>
+        </p:nvSpPr>
+        <p:spPr/>
+        <p:txBody>
+          <a:bodyPr/>
+          <a:lstStyle/>
+          <a:p>
+            <a:r>
+              <a:rPr lang="pl-PL" dirty="0" smtClean="0"/>
+              <a:t>Webpack</a:t>
+            </a:r>
+            <a:r>
+              <a:rPr lang="en-US" dirty="0" smtClean="0"/>
+              <a:t> is a Module Bundler</a:t>
+            </a:r>
+            <a:endParaRPr lang="en-US" dirty="0"/>
+          </a:p>
+        </p:txBody>
+      </p:sp>
+      <p:pic>
+        <p:nvPicPr>
+          <p:cNvPr id="5" name="Content Placeholder 4"/>
+          <p:cNvPicPr>
+            <a:picLocks noGrp="1" noChangeAspect="1"/>
+          </p:cNvPicPr>
+          <p:nvPr>
+            <p:ph idx="1"/>
+          </p:nvPr>
+        </p:nvPicPr>
+        <p:blipFill>
+          <a:blip r:embed="rId2">
+            <a:extLst>
+              <a:ext uri="{28A0092B-C50C-407E-A947-70E740481C1C}">
+                <a14:useLocalDpi xmlns:a14="http://schemas.microsoft.com/office/drawing/2010/main" val="0"/>
+              </a:ext>
+            </a:extLst>
+          </a:blip>
+          <a:stretch>
+            <a:fillRect/>
+          </a:stretch>
+        </p:blipFill>
+        <p:spPr>
+          <a:xfrm>
+            <a:off x="2746375" y="2286000"/>
+            <a:ext cx="7188200" cy="3594100"/>
+          </a:xfrm>
+        </p:spPr>
+      </p:pic>
+    </p:spTree>
+    <p:extLst>
+      <p:ext uri="{BB962C8B-B14F-4D97-AF65-F5344CB8AC3E}">
+        <p14:creationId xmlns:p14="http://schemas.microsoft.com/office/powerpoint/2010/main" val="448580860"/>
       </p:ext>
     </p:extLst>
   </p:cSld>

</xml_diff>

<commit_message>
Added jspm and missing dependencies. Added angular 1 demo.
</commit_message>
<xml_diff>
--- a/webpack/WebPack.pptx
+++ b/webpack/WebPack.pptx
@@ -12,6 +12,10 @@
     <p:sldId id="261" r:id="rId6"/>
     <p:sldId id="262" r:id="rId7"/>
     <p:sldId id="259" r:id="rId8"/>
+    <p:sldId id="263" r:id="rId9"/>
+    <p:sldId id="264" r:id="rId10"/>
+    <p:sldId id="265" r:id="rId11"/>
+    <p:sldId id="266" r:id="rId12"/>
   </p:sldIdLst>
   <p:sldSz cx="12192000" cy="6858000"/>
   <p:notesSz cx="6858000" cy="9144000"/>
@@ -114,6 +118,753 @@
 </file>
 
 <file path=ppt/diagrams/colors1.xml><?xml version="1.0" encoding="utf-8"?>
+<dgm:colorsDef xmlns:dgm="http://schemas.openxmlformats.org/drawingml/2006/diagram" xmlns:a="http://schemas.openxmlformats.org/drawingml/2006/main" uniqueId="urn:microsoft.com/office/officeart/2005/8/colors/accent1_2">
+  <dgm:title val=""/>
+  <dgm:desc val=""/>
+  <dgm:catLst>
+    <dgm:cat type="accent1" pri="11200"/>
+  </dgm:catLst>
+  <dgm:styleLbl name="node0">
+    <dgm:fillClrLst meth="repeat">
+      <a:schemeClr val="accent1"/>
+    </dgm:fillClrLst>
+    <dgm:linClrLst meth="repeat">
+      <a:schemeClr val="lt1"/>
+    </dgm:linClrLst>
+    <dgm:effectClrLst/>
+    <dgm:txLinClrLst/>
+    <dgm:txFillClrLst/>
+    <dgm:txEffectClrLst/>
+  </dgm:styleLbl>
+  <dgm:styleLbl name="alignNode1">
+    <dgm:fillClrLst meth="repeat">
+      <a:schemeClr val="accent1"/>
+    </dgm:fillClrLst>
+    <dgm:linClrLst meth="repeat">
+      <a:schemeClr val="accent1"/>
+    </dgm:linClrLst>
+    <dgm:effectClrLst/>
+    <dgm:txLinClrLst/>
+    <dgm:txFillClrLst/>
+    <dgm:txEffectClrLst/>
+  </dgm:styleLbl>
+  <dgm:styleLbl name="node1">
+    <dgm:fillClrLst meth="repeat">
+      <a:schemeClr val="accent1"/>
+    </dgm:fillClrLst>
+    <dgm:linClrLst meth="repeat">
+      <a:schemeClr val="lt1"/>
+    </dgm:linClrLst>
+    <dgm:effectClrLst/>
+    <dgm:txLinClrLst/>
+    <dgm:txFillClrLst/>
+    <dgm:txEffectClrLst/>
+  </dgm:styleLbl>
+  <dgm:styleLbl name="lnNode1">
+    <dgm:fillClrLst meth="repeat">
+      <a:schemeClr val="accent1"/>
+    </dgm:fillClrLst>
+    <dgm:linClrLst meth="repeat">
+      <a:schemeClr val="lt1"/>
+    </dgm:linClrLst>
+    <dgm:effectClrLst/>
+    <dgm:txLinClrLst/>
+    <dgm:txFillClrLst/>
+    <dgm:txEffectClrLst/>
+  </dgm:styleLbl>
+  <dgm:styleLbl name="vennNode1">
+    <dgm:fillClrLst meth="repeat">
+      <a:schemeClr val="accent1">
+        <a:alpha val="50000"/>
+      </a:schemeClr>
+    </dgm:fillClrLst>
+    <dgm:linClrLst meth="repeat">
+      <a:schemeClr val="lt1"/>
+    </dgm:linClrLst>
+    <dgm:effectClrLst/>
+    <dgm:txLinClrLst/>
+    <dgm:txFillClrLst/>
+    <dgm:txEffectClrLst/>
+  </dgm:styleLbl>
+  <dgm:styleLbl name="node2">
+    <dgm:fillClrLst meth="repeat">
+      <a:schemeClr val="accent1"/>
+    </dgm:fillClrLst>
+    <dgm:linClrLst meth="repeat">
+      <a:schemeClr val="lt1"/>
+    </dgm:linClrLst>
+    <dgm:effectClrLst/>
+    <dgm:txLinClrLst/>
+    <dgm:txFillClrLst/>
+    <dgm:txEffectClrLst/>
+  </dgm:styleLbl>
+  <dgm:styleLbl name="node3">
+    <dgm:fillClrLst meth="repeat">
+      <a:schemeClr val="accent1"/>
+    </dgm:fillClrLst>
+    <dgm:linClrLst meth="repeat">
+      <a:schemeClr val="lt1"/>
+    </dgm:linClrLst>
+    <dgm:effectClrLst/>
+    <dgm:txLinClrLst/>
+    <dgm:txFillClrLst/>
+    <dgm:txEffectClrLst/>
+  </dgm:styleLbl>
+  <dgm:styleLbl name="node4">
+    <dgm:fillClrLst meth="repeat">
+      <a:schemeClr val="accent1"/>
+    </dgm:fillClrLst>
+    <dgm:linClrLst meth="repeat">
+      <a:schemeClr val="lt1"/>
+    </dgm:linClrLst>
+    <dgm:effectClrLst/>
+    <dgm:txLinClrLst/>
+    <dgm:txFillClrLst/>
+    <dgm:txEffectClrLst/>
+  </dgm:styleLbl>
+  <dgm:styleLbl name="fgImgPlace1">
+    <dgm:fillClrLst meth="repeat">
+      <a:schemeClr val="accent1">
+        <a:tint val="50000"/>
+      </a:schemeClr>
+    </dgm:fillClrLst>
+    <dgm:linClrLst meth="repeat">
+      <a:schemeClr val="lt1"/>
+    </dgm:linClrLst>
+    <dgm:effectClrLst/>
+    <dgm:txLinClrLst/>
+    <dgm:txFillClrLst meth="repeat">
+      <a:schemeClr val="lt1"/>
+    </dgm:txFillClrLst>
+    <dgm:txEffectClrLst/>
+  </dgm:styleLbl>
+  <dgm:styleLbl name="alignImgPlace1">
+    <dgm:fillClrLst meth="repeat">
+      <a:schemeClr val="accent1">
+        <a:tint val="50000"/>
+      </a:schemeClr>
+    </dgm:fillClrLst>
+    <dgm:linClrLst meth="repeat">
+      <a:schemeClr val="lt1"/>
+    </dgm:linClrLst>
+    <dgm:effectClrLst/>
+    <dgm:txLinClrLst/>
+    <dgm:txFillClrLst meth="repeat">
+      <a:schemeClr val="lt1"/>
+    </dgm:txFillClrLst>
+    <dgm:txEffectClrLst/>
+  </dgm:styleLbl>
+  <dgm:styleLbl name="bgImgPlace1">
+    <dgm:fillClrLst meth="repeat">
+      <a:schemeClr val="accent1">
+        <a:tint val="50000"/>
+      </a:schemeClr>
+    </dgm:fillClrLst>
+    <dgm:linClrLst meth="repeat">
+      <a:schemeClr val="lt1"/>
+    </dgm:linClrLst>
+    <dgm:effectClrLst/>
+    <dgm:txLinClrLst/>
+    <dgm:txFillClrLst meth="repeat">
+      <a:schemeClr val="lt1"/>
+    </dgm:txFillClrLst>
+    <dgm:txEffectClrLst/>
+  </dgm:styleLbl>
+  <dgm:styleLbl name="sibTrans2D1">
+    <dgm:fillClrLst meth="repeat">
+      <a:schemeClr val="accent1">
+        <a:tint val="60000"/>
+      </a:schemeClr>
+    </dgm:fillClrLst>
+    <dgm:linClrLst meth="repeat">
+      <a:schemeClr val="accent1">
+        <a:tint val="60000"/>
+      </a:schemeClr>
+    </dgm:linClrLst>
+    <dgm:effectClrLst/>
+    <dgm:txLinClrLst/>
+    <dgm:txFillClrLst/>
+    <dgm:txEffectClrLst/>
+  </dgm:styleLbl>
+  <dgm:styleLbl name="fgSibTrans2D1">
+    <dgm:fillClrLst meth="repeat">
+      <a:schemeClr val="accent1">
+        <a:tint val="60000"/>
+      </a:schemeClr>
+    </dgm:fillClrLst>
+    <dgm:linClrLst meth="repeat">
+      <a:schemeClr val="accent1">
+        <a:tint val="60000"/>
+      </a:schemeClr>
+    </dgm:linClrLst>
+    <dgm:effectClrLst/>
+    <dgm:txLinClrLst/>
+    <dgm:txFillClrLst/>
+    <dgm:txEffectClrLst/>
+  </dgm:styleLbl>
+  <dgm:styleLbl name="bgSibTrans2D1">
+    <dgm:fillClrLst meth="repeat">
+      <a:schemeClr val="accent1">
+        <a:tint val="60000"/>
+      </a:schemeClr>
+    </dgm:fillClrLst>
+    <dgm:linClrLst meth="repeat">
+      <a:schemeClr val="accent1">
+        <a:tint val="60000"/>
+      </a:schemeClr>
+    </dgm:linClrLst>
+    <dgm:effectClrLst/>
+    <dgm:txLinClrLst/>
+    <dgm:txFillClrLst/>
+    <dgm:txEffectClrLst/>
+  </dgm:styleLbl>
+  <dgm:styleLbl name="sibTrans1D1">
+    <dgm:fillClrLst meth="repeat">
+      <a:schemeClr val="accent1"/>
+    </dgm:fillClrLst>
+    <dgm:linClrLst meth="repeat">
+      <a:schemeClr val="accent1"/>
+    </dgm:linClrLst>
+    <dgm:effectClrLst/>
+    <dgm:txLinClrLst/>
+    <dgm:txFillClrLst meth="repeat">
+      <a:schemeClr val="tx1"/>
+    </dgm:txFillClrLst>
+    <dgm:txEffectClrLst/>
+  </dgm:styleLbl>
+  <dgm:styleLbl name="callout">
+    <dgm:fillClrLst meth="repeat">
+      <a:schemeClr val="accent1"/>
+    </dgm:fillClrLst>
+    <dgm:linClrLst meth="repeat">
+      <a:schemeClr val="accent1">
+        <a:tint val="50000"/>
+      </a:schemeClr>
+    </dgm:linClrLst>
+    <dgm:effectClrLst/>
+    <dgm:txLinClrLst/>
+    <dgm:txFillClrLst meth="repeat">
+      <a:schemeClr val="tx1"/>
+    </dgm:txFillClrLst>
+    <dgm:txEffectClrLst/>
+  </dgm:styleLbl>
+  <dgm:styleLbl name="asst0">
+    <dgm:fillClrLst meth="repeat">
+      <a:schemeClr val="accent1"/>
+    </dgm:fillClrLst>
+    <dgm:linClrLst meth="repeat">
+      <a:schemeClr val="lt1"/>
+    </dgm:linClrLst>
+    <dgm:effectClrLst/>
+    <dgm:txLinClrLst/>
+    <dgm:txFillClrLst/>
+    <dgm:txEffectClrLst/>
+  </dgm:styleLbl>
+  <dgm:styleLbl name="asst1">
+    <dgm:fillClrLst meth="repeat">
+      <a:schemeClr val="accent1"/>
+    </dgm:fillClrLst>
+    <dgm:linClrLst meth="repeat">
+      <a:schemeClr val="lt1"/>
+    </dgm:linClrLst>
+    <dgm:effectClrLst/>
+    <dgm:txLinClrLst/>
+    <dgm:txFillClrLst/>
+    <dgm:txEffectClrLst/>
+  </dgm:styleLbl>
+  <dgm:styleLbl name="asst2">
+    <dgm:fillClrLst meth="repeat">
+      <a:schemeClr val="accent1"/>
+    </dgm:fillClrLst>
+    <dgm:linClrLst meth="repeat">
+      <a:schemeClr val="lt1"/>
+    </dgm:linClrLst>
+    <dgm:effectClrLst/>
+    <dgm:txLinClrLst/>
+    <dgm:txFillClrLst/>
+    <dgm:txEffectClrLst/>
+  </dgm:styleLbl>
+  <dgm:styleLbl name="asst3">
+    <dgm:fillClrLst meth="repeat">
+      <a:schemeClr val="accent1"/>
+    </dgm:fillClrLst>
+    <dgm:linClrLst meth="repeat">
+      <a:schemeClr val="lt1"/>
+    </dgm:linClrLst>
+    <dgm:effectClrLst/>
+    <dgm:txLinClrLst/>
+    <dgm:txFillClrLst/>
+    <dgm:txEffectClrLst/>
+  </dgm:styleLbl>
+  <dgm:styleLbl name="asst4">
+    <dgm:fillClrLst meth="repeat">
+      <a:schemeClr val="accent1"/>
+    </dgm:fillClrLst>
+    <dgm:linClrLst meth="repeat">
+      <a:schemeClr val="lt1"/>
+    </dgm:linClrLst>
+    <dgm:effectClrLst/>
+    <dgm:txLinClrLst/>
+    <dgm:txFillClrLst/>
+    <dgm:txEffectClrLst/>
+  </dgm:styleLbl>
+  <dgm:styleLbl name="parChTrans2D1">
+    <dgm:fillClrLst meth="repeat">
+      <a:schemeClr val="accent1">
+        <a:tint val="60000"/>
+      </a:schemeClr>
+    </dgm:fillClrLst>
+    <dgm:linClrLst meth="repeat">
+      <a:schemeClr val="accent1">
+        <a:tint val="60000"/>
+      </a:schemeClr>
+    </dgm:linClrLst>
+    <dgm:effectClrLst/>
+    <dgm:txLinClrLst/>
+    <dgm:txFillClrLst meth="repeat">
+      <a:schemeClr val="lt1"/>
+    </dgm:txFillClrLst>
+    <dgm:txEffectClrLst/>
+  </dgm:styleLbl>
+  <dgm:styleLbl name="parChTrans2D2">
+    <dgm:fillClrLst meth="repeat">
+      <a:schemeClr val="accent1"/>
+    </dgm:fillClrLst>
+    <dgm:linClrLst meth="repeat">
+      <a:schemeClr val="accent1"/>
+    </dgm:linClrLst>
+    <dgm:effectClrLst/>
+    <dgm:txLinClrLst/>
+    <dgm:txFillClrLst meth="repeat">
+      <a:schemeClr val="lt1"/>
+    </dgm:txFillClrLst>
+    <dgm:txEffectClrLst/>
+  </dgm:styleLbl>
+  <dgm:styleLbl name="parChTrans2D3">
+    <dgm:fillClrLst meth="repeat">
+      <a:schemeClr val="accent1"/>
+    </dgm:fillClrLst>
+    <dgm:linClrLst meth="repeat">
+      <a:schemeClr val="accent1"/>
+    </dgm:linClrLst>
+    <dgm:effectClrLst/>
+    <dgm:txLinClrLst/>
+    <dgm:txFillClrLst meth="repeat">
+      <a:schemeClr val="lt1"/>
+    </dgm:txFillClrLst>
+    <dgm:txEffectClrLst/>
+  </dgm:styleLbl>
+  <dgm:styleLbl name="parChTrans2D4">
+    <dgm:fillClrLst meth="repeat">
+      <a:schemeClr val="accent1"/>
+    </dgm:fillClrLst>
+    <dgm:linClrLst meth="repeat">
+      <a:schemeClr val="accent1"/>
+    </dgm:linClrLst>
+    <dgm:effectClrLst/>
+    <dgm:txLinClrLst/>
+    <dgm:txFillClrLst meth="repeat">
+      <a:schemeClr val="lt1"/>
+    </dgm:txFillClrLst>
+    <dgm:txEffectClrLst/>
+  </dgm:styleLbl>
+  <dgm:styleLbl name="parChTrans1D1">
+    <dgm:fillClrLst meth="repeat">
+      <a:schemeClr val="accent1"/>
+    </dgm:fillClrLst>
+    <dgm:linClrLst meth="repeat">
+      <a:schemeClr val="accent1">
+        <a:shade val="60000"/>
+      </a:schemeClr>
+    </dgm:linClrLst>
+    <dgm:effectClrLst/>
+    <dgm:txLinClrLst/>
+    <dgm:txFillClrLst meth="repeat">
+      <a:schemeClr val="tx1"/>
+    </dgm:txFillClrLst>
+    <dgm:txEffectClrLst/>
+  </dgm:styleLbl>
+  <dgm:styleLbl name="parChTrans1D2">
+    <dgm:fillClrLst meth="repeat">
+      <a:schemeClr val="accent1"/>
+    </dgm:fillClrLst>
+    <dgm:linClrLst meth="repeat">
+      <a:schemeClr val="accent1">
+        <a:shade val="60000"/>
+      </a:schemeClr>
+    </dgm:linClrLst>
+    <dgm:effectClrLst/>
+    <dgm:txLinClrLst/>
+    <dgm:txFillClrLst meth="repeat">
+      <a:schemeClr val="tx1"/>
+    </dgm:txFillClrLst>
+    <dgm:txEffectClrLst/>
+  </dgm:styleLbl>
+  <dgm:styleLbl name="parChTrans1D3">
+    <dgm:fillClrLst meth="repeat">
+      <a:schemeClr val="accent1"/>
+    </dgm:fillClrLst>
+    <dgm:linClrLst meth="repeat">
+      <a:schemeClr val="accent1">
+        <a:shade val="80000"/>
+      </a:schemeClr>
+    </dgm:linClrLst>
+    <dgm:effectClrLst/>
+    <dgm:txLinClrLst/>
+    <dgm:txFillClrLst meth="repeat">
+      <a:schemeClr val="tx1"/>
+    </dgm:txFillClrLst>
+    <dgm:txEffectClrLst/>
+  </dgm:styleLbl>
+  <dgm:styleLbl name="parChTrans1D4">
+    <dgm:fillClrLst meth="repeat">
+      <a:schemeClr val="accent1"/>
+    </dgm:fillClrLst>
+    <dgm:linClrLst meth="repeat">
+      <a:schemeClr val="accent1">
+        <a:shade val="80000"/>
+      </a:schemeClr>
+    </dgm:linClrLst>
+    <dgm:effectClrLst/>
+    <dgm:txLinClrLst/>
+    <dgm:txFillClrLst meth="repeat">
+      <a:schemeClr val="tx1"/>
+    </dgm:txFillClrLst>
+    <dgm:txEffectClrLst/>
+  </dgm:styleLbl>
+  <dgm:styleLbl name="fgAcc1">
+    <dgm:fillClrLst meth="repeat">
+      <a:schemeClr val="lt1">
+        <a:alpha val="90000"/>
+      </a:schemeClr>
+    </dgm:fillClrLst>
+    <dgm:linClrLst meth="repeat">
+      <a:schemeClr val="accent1"/>
+    </dgm:linClrLst>
+    <dgm:effectClrLst/>
+    <dgm:txLinClrLst/>
+    <dgm:txFillClrLst meth="repeat">
+      <a:schemeClr val="dk1"/>
+    </dgm:txFillClrLst>
+    <dgm:txEffectClrLst/>
+  </dgm:styleLbl>
+  <dgm:styleLbl name="conFgAcc1">
+    <dgm:fillClrLst meth="repeat">
+      <a:schemeClr val="lt1">
+        <a:alpha val="90000"/>
+      </a:schemeClr>
+    </dgm:fillClrLst>
+    <dgm:linClrLst meth="repeat">
+      <a:schemeClr val="accent1"/>
+    </dgm:linClrLst>
+    <dgm:effectClrLst/>
+    <dgm:txLinClrLst/>
+    <dgm:txFillClrLst meth="repeat">
+      <a:schemeClr val="dk1"/>
+    </dgm:txFillClrLst>
+    <dgm:txEffectClrLst/>
+  </dgm:styleLbl>
+  <dgm:styleLbl name="alignAcc1">
+    <dgm:fillClrLst meth="repeat">
+      <a:schemeClr val="lt1">
+        <a:alpha val="90000"/>
+      </a:schemeClr>
+    </dgm:fillClrLst>
+    <dgm:linClrLst meth="repeat">
+      <a:schemeClr val="accent1"/>
+    </dgm:linClrLst>
+    <dgm:effectClrLst/>
+    <dgm:txLinClrLst/>
+    <dgm:txFillClrLst meth="repeat">
+      <a:schemeClr val="dk1"/>
+    </dgm:txFillClrLst>
+    <dgm:txEffectClrLst/>
+  </dgm:styleLbl>
+  <dgm:styleLbl name="trAlignAcc1">
+    <dgm:fillClrLst meth="repeat">
+      <a:schemeClr val="lt1">
+        <a:alpha val="40000"/>
+      </a:schemeClr>
+    </dgm:fillClrLst>
+    <dgm:linClrLst meth="repeat">
+      <a:schemeClr val="accent1"/>
+    </dgm:linClrLst>
+    <dgm:effectClrLst/>
+    <dgm:txLinClrLst/>
+    <dgm:txFillClrLst meth="repeat">
+      <a:schemeClr val="dk1"/>
+    </dgm:txFillClrLst>
+    <dgm:txEffectClrLst/>
+  </dgm:styleLbl>
+  <dgm:styleLbl name="bgAcc1">
+    <dgm:fillClrLst meth="repeat">
+      <a:schemeClr val="lt1">
+        <a:alpha val="90000"/>
+      </a:schemeClr>
+    </dgm:fillClrLst>
+    <dgm:linClrLst meth="repeat">
+      <a:schemeClr val="accent1"/>
+    </dgm:linClrLst>
+    <dgm:effectClrLst/>
+    <dgm:txLinClrLst/>
+    <dgm:txFillClrLst meth="repeat">
+      <a:schemeClr val="dk1"/>
+    </dgm:txFillClrLst>
+    <dgm:txEffectClrLst/>
+  </dgm:styleLbl>
+  <dgm:styleLbl name="solidFgAcc1">
+    <dgm:fillClrLst meth="repeat">
+      <a:schemeClr val="lt1"/>
+    </dgm:fillClrLst>
+    <dgm:linClrLst meth="repeat">
+      <a:schemeClr val="accent1"/>
+    </dgm:linClrLst>
+    <dgm:effectClrLst/>
+    <dgm:txLinClrLst/>
+    <dgm:txFillClrLst meth="repeat">
+      <a:schemeClr val="dk1"/>
+    </dgm:txFillClrLst>
+    <dgm:txEffectClrLst/>
+  </dgm:styleLbl>
+  <dgm:styleLbl name="solidAlignAcc1">
+    <dgm:fillClrLst meth="repeat">
+      <a:schemeClr val="lt1"/>
+    </dgm:fillClrLst>
+    <dgm:linClrLst meth="repeat">
+      <a:schemeClr val="accent1"/>
+    </dgm:linClrLst>
+    <dgm:effectClrLst/>
+    <dgm:txLinClrLst/>
+    <dgm:txFillClrLst meth="repeat">
+      <a:schemeClr val="dk1"/>
+    </dgm:txFillClrLst>
+    <dgm:txEffectClrLst/>
+  </dgm:styleLbl>
+  <dgm:styleLbl name="solidBgAcc1">
+    <dgm:fillClrLst meth="repeat">
+      <a:schemeClr val="lt1"/>
+    </dgm:fillClrLst>
+    <dgm:linClrLst meth="repeat">
+      <a:schemeClr val="accent1"/>
+    </dgm:linClrLst>
+    <dgm:effectClrLst/>
+    <dgm:txLinClrLst/>
+    <dgm:txFillClrLst meth="repeat">
+      <a:schemeClr val="dk1"/>
+    </dgm:txFillClrLst>
+    <dgm:txEffectClrLst/>
+  </dgm:styleLbl>
+  <dgm:styleLbl name="fgAccFollowNode1">
+    <dgm:fillClrLst meth="repeat">
+      <a:schemeClr val="accent1">
+        <a:alpha val="90000"/>
+        <a:tint val="40000"/>
+      </a:schemeClr>
+    </dgm:fillClrLst>
+    <dgm:linClrLst meth="repeat">
+      <a:schemeClr val="accent1">
+        <a:alpha val="90000"/>
+        <a:tint val="40000"/>
+      </a:schemeClr>
+    </dgm:linClrLst>
+    <dgm:effectClrLst/>
+    <dgm:txLinClrLst/>
+    <dgm:txFillClrLst meth="repeat">
+      <a:schemeClr val="dk1"/>
+    </dgm:txFillClrLst>
+    <dgm:txEffectClrLst/>
+  </dgm:styleLbl>
+  <dgm:styleLbl name="alignAccFollowNode1">
+    <dgm:fillClrLst meth="repeat">
+      <a:schemeClr val="accent1">
+        <a:alpha val="90000"/>
+        <a:tint val="40000"/>
+      </a:schemeClr>
+    </dgm:fillClrLst>
+    <dgm:linClrLst meth="repeat">
+      <a:schemeClr val="accent1">
+        <a:alpha val="90000"/>
+        <a:tint val="40000"/>
+      </a:schemeClr>
+    </dgm:linClrLst>
+    <dgm:effectClrLst/>
+    <dgm:txLinClrLst/>
+    <dgm:txFillClrLst meth="repeat">
+      <a:schemeClr val="dk1"/>
+    </dgm:txFillClrLst>
+    <dgm:txEffectClrLst/>
+  </dgm:styleLbl>
+  <dgm:styleLbl name="bgAccFollowNode1">
+    <dgm:fillClrLst meth="repeat">
+      <a:schemeClr val="accent1">
+        <a:alpha val="90000"/>
+        <a:tint val="40000"/>
+      </a:schemeClr>
+    </dgm:fillClrLst>
+    <dgm:linClrLst meth="repeat">
+      <a:schemeClr val="accent1">
+        <a:alpha val="90000"/>
+        <a:tint val="40000"/>
+      </a:schemeClr>
+    </dgm:linClrLst>
+    <dgm:effectClrLst/>
+    <dgm:txLinClrLst/>
+    <dgm:txFillClrLst meth="repeat">
+      <a:schemeClr val="dk1"/>
+    </dgm:txFillClrLst>
+    <dgm:txEffectClrLst/>
+  </dgm:styleLbl>
+  <dgm:styleLbl name="fgAcc0">
+    <dgm:fillClrLst meth="repeat">
+      <a:schemeClr val="lt1">
+        <a:alpha val="90000"/>
+      </a:schemeClr>
+    </dgm:fillClrLst>
+    <dgm:linClrLst meth="repeat">
+      <a:schemeClr val="accent1"/>
+    </dgm:linClrLst>
+    <dgm:effectClrLst/>
+    <dgm:txLinClrLst/>
+    <dgm:txFillClrLst meth="repeat">
+      <a:schemeClr val="dk1"/>
+    </dgm:txFillClrLst>
+    <dgm:txEffectClrLst/>
+  </dgm:styleLbl>
+  <dgm:styleLbl name="fgAcc2">
+    <dgm:fillClrLst meth="repeat">
+      <a:schemeClr val="lt1">
+        <a:alpha val="90000"/>
+      </a:schemeClr>
+    </dgm:fillClrLst>
+    <dgm:linClrLst meth="repeat">
+      <a:schemeClr val="accent1"/>
+    </dgm:linClrLst>
+    <dgm:effectClrLst/>
+    <dgm:txLinClrLst/>
+    <dgm:txFillClrLst meth="repeat">
+      <a:schemeClr val="dk1"/>
+    </dgm:txFillClrLst>
+    <dgm:txEffectClrLst/>
+  </dgm:styleLbl>
+  <dgm:styleLbl name="fgAcc3">
+    <dgm:fillClrLst meth="repeat">
+      <a:schemeClr val="lt1">
+        <a:alpha val="90000"/>
+      </a:schemeClr>
+    </dgm:fillClrLst>
+    <dgm:linClrLst meth="repeat">
+      <a:schemeClr val="accent1"/>
+    </dgm:linClrLst>
+    <dgm:effectClrLst/>
+    <dgm:txLinClrLst/>
+    <dgm:txFillClrLst meth="repeat">
+      <a:schemeClr val="dk1"/>
+    </dgm:txFillClrLst>
+    <dgm:txEffectClrLst/>
+  </dgm:styleLbl>
+  <dgm:styleLbl name="fgAcc4">
+    <dgm:fillClrLst meth="repeat">
+      <a:schemeClr val="lt1">
+        <a:alpha val="90000"/>
+      </a:schemeClr>
+    </dgm:fillClrLst>
+    <dgm:linClrLst meth="repeat">
+      <a:schemeClr val="accent1"/>
+    </dgm:linClrLst>
+    <dgm:effectClrLst/>
+    <dgm:txLinClrLst/>
+    <dgm:txFillClrLst meth="repeat">
+      <a:schemeClr val="dk1"/>
+    </dgm:txFillClrLst>
+    <dgm:txEffectClrLst/>
+  </dgm:styleLbl>
+  <dgm:styleLbl name="bgShp">
+    <dgm:fillClrLst meth="repeat">
+      <a:schemeClr val="accent1">
+        <a:tint val="40000"/>
+      </a:schemeClr>
+    </dgm:fillClrLst>
+    <dgm:linClrLst meth="repeat">
+      <a:schemeClr val="accent1"/>
+    </dgm:linClrLst>
+    <dgm:effectClrLst/>
+    <dgm:txLinClrLst/>
+    <dgm:txFillClrLst meth="repeat">
+      <a:schemeClr val="dk1"/>
+    </dgm:txFillClrLst>
+    <dgm:txEffectClrLst/>
+  </dgm:styleLbl>
+  <dgm:styleLbl name="dkBgShp">
+    <dgm:fillClrLst meth="repeat">
+      <a:schemeClr val="accent1">
+        <a:shade val="80000"/>
+      </a:schemeClr>
+    </dgm:fillClrLst>
+    <dgm:linClrLst meth="repeat">
+      <a:schemeClr val="accent1"/>
+    </dgm:linClrLst>
+    <dgm:effectClrLst/>
+    <dgm:txLinClrLst/>
+    <dgm:txFillClrLst meth="repeat">
+      <a:schemeClr val="lt1"/>
+    </dgm:txFillClrLst>
+    <dgm:txEffectClrLst/>
+  </dgm:styleLbl>
+  <dgm:styleLbl name="trBgShp">
+    <dgm:fillClrLst meth="repeat">
+      <a:schemeClr val="accent1">
+        <a:tint val="50000"/>
+        <a:alpha val="40000"/>
+      </a:schemeClr>
+    </dgm:fillClrLst>
+    <dgm:linClrLst meth="repeat">
+      <a:schemeClr val="accent1"/>
+    </dgm:linClrLst>
+    <dgm:effectClrLst/>
+    <dgm:txLinClrLst/>
+    <dgm:txFillClrLst meth="repeat">
+      <a:schemeClr val="lt1"/>
+    </dgm:txFillClrLst>
+    <dgm:txEffectClrLst/>
+  </dgm:styleLbl>
+  <dgm:styleLbl name="fgShp">
+    <dgm:fillClrLst meth="repeat">
+      <a:schemeClr val="accent1">
+        <a:tint val="60000"/>
+      </a:schemeClr>
+    </dgm:fillClrLst>
+    <dgm:linClrLst meth="repeat">
+      <a:schemeClr val="lt1"/>
+    </dgm:linClrLst>
+    <dgm:effectClrLst/>
+    <dgm:txLinClrLst/>
+    <dgm:txFillClrLst meth="repeat">
+      <a:schemeClr val="dk1"/>
+    </dgm:txFillClrLst>
+    <dgm:txEffectClrLst/>
+  </dgm:styleLbl>
+  <dgm:styleLbl name="revTx">
+    <dgm:fillClrLst meth="repeat">
+      <a:schemeClr val="lt1">
+        <a:alpha val="0"/>
+      </a:schemeClr>
+    </dgm:fillClrLst>
+    <dgm:linClrLst meth="repeat">
+      <a:schemeClr val="dk1">
+        <a:alpha val="0"/>
+      </a:schemeClr>
+    </dgm:linClrLst>
+    <dgm:effectClrLst/>
+    <dgm:txLinClrLst/>
+    <dgm:txFillClrLst meth="repeat">
+      <a:schemeClr val="tx1"/>
+    </dgm:txFillClrLst>
+    <dgm:txEffectClrLst/>
+  </dgm:styleLbl>
+</dgm:colorsDef>
+</file>
+
+<file path=ppt/diagrams/colors2.xml><?xml version="1.0" encoding="utf-8"?>
 <dgm:colorsDef xmlns:dgm="http://schemas.openxmlformats.org/drawingml/2006/diagram" xmlns:a="http://schemas.openxmlformats.org/drawingml/2006/main" uniqueId="urn:microsoft.com/office/officeart/2005/8/colors/accent1_2">
   <dgm:title val=""/>
   <dgm:desc val=""/>
@@ -1135,6 +1886,310 @@
     <dgm:cxn modelId="{77CB6FF9-D975-48CF-9A11-5B9F12AE85DB}" type="presParOf" srcId="{723F2CD6-6926-4722-A6BB-03F723EB25A9}" destId="{FAF47A9A-1EB7-4A6E-83F9-284F142791B1}" srcOrd="4" destOrd="0" presId="urn:microsoft.com/office/officeart/2005/8/layout/funnel1"/>
     <dgm:cxn modelId="{B46ACE69-B871-4A51-9012-413377E56F7F}" type="presParOf" srcId="{723F2CD6-6926-4722-A6BB-03F723EB25A9}" destId="{6DDF66CD-0C2B-4205-8C71-B3739785D8FB}" srcOrd="5" destOrd="0" presId="urn:microsoft.com/office/officeart/2005/8/layout/funnel1"/>
     <dgm:cxn modelId="{256D1AD4-98DA-479B-BF62-BFF72FBB430C}" type="presParOf" srcId="{723F2CD6-6926-4722-A6BB-03F723EB25A9}" destId="{6B0E0B26-1317-447B-B019-5BB868B65394}" srcOrd="6" destOrd="0" presId="urn:microsoft.com/office/officeart/2005/8/layout/funnel1"/>
+  </dgm:cxnLst>
+  <dgm:bg/>
+  <dgm:whole/>
+  <dgm:extLst>
+    <a:ext uri="http://schemas.microsoft.com/office/drawing/2008/diagram">
+      <dsp:dataModelExt xmlns:dsp="http://schemas.microsoft.com/office/drawing/2008/diagram" relId="rId6" minVer="http://schemas.openxmlformats.org/drawingml/2006/diagram"/>
+    </a:ext>
+  </dgm:extLst>
+</dgm:dataModel>
+</file>
+
+<file path=ppt/diagrams/data2.xml><?xml version="1.0" encoding="utf-8"?>
+<dgm:dataModel xmlns:dgm="http://schemas.openxmlformats.org/drawingml/2006/diagram" xmlns:a="http://schemas.openxmlformats.org/drawingml/2006/main">
+  <dgm:ptLst>
+    <dgm:pt modelId="{E8DA5A7A-97A7-4595-B185-F93D7B7E8784}" type="doc">
+      <dgm:prSet loTypeId="urn:microsoft.com/office/officeart/2005/8/layout/radial3" loCatId="cycle" qsTypeId="urn:microsoft.com/office/officeart/2005/8/quickstyle/simple3" qsCatId="simple" csTypeId="urn:microsoft.com/office/officeart/2005/8/colors/accent1_2" csCatId="accent1" phldr="1"/>
+      <dgm:spPr/>
+      <dgm:t>
+        <a:bodyPr/>
+        <a:lstStyle/>
+        <a:p>
+          <a:endParaRPr lang="en-US"/>
+        </a:p>
+      </dgm:t>
+    </dgm:pt>
+    <dgm:pt modelId="{09BE3C5E-06CA-4214-BBBF-B55E9EAA87DA}">
+      <dgm:prSet phldrT="[Text]"/>
+      <dgm:spPr/>
+      <dgm:t>
+        <a:bodyPr/>
+        <a:lstStyle/>
+        <a:p>
+          <a:r>
+            <a:rPr lang="en-US" dirty="0" err="1" smtClean="0"/>
+            <a:t>WebPack</a:t>
+          </a:r>
+          <a:endParaRPr lang="en-US" dirty="0"/>
+        </a:p>
+      </dgm:t>
+    </dgm:pt>
+    <dgm:pt modelId="{E15746A0-7C12-4BE7-9638-148E267912EE}" type="parTrans" cxnId="{210D3B8B-B85A-4687-9AF7-847C9CBE0CBD}">
+      <dgm:prSet/>
+      <dgm:spPr/>
+      <dgm:t>
+        <a:bodyPr/>
+        <a:lstStyle/>
+        <a:p>
+          <a:endParaRPr lang="en-US"/>
+        </a:p>
+      </dgm:t>
+    </dgm:pt>
+    <dgm:pt modelId="{94849A0B-41A7-4CE2-9F22-F4525FA66A83}" type="sibTrans" cxnId="{210D3B8B-B85A-4687-9AF7-847C9CBE0CBD}">
+      <dgm:prSet/>
+      <dgm:spPr/>
+      <dgm:t>
+        <a:bodyPr/>
+        <a:lstStyle/>
+        <a:p>
+          <a:endParaRPr lang="en-US"/>
+        </a:p>
+      </dgm:t>
+    </dgm:pt>
+    <dgm:pt modelId="{82C97B19-D202-4F11-A8FA-439EE7571F26}">
+      <dgm:prSet phldrT="[Text]"/>
+      <dgm:spPr/>
+      <dgm:t>
+        <a:bodyPr/>
+        <a:lstStyle/>
+        <a:p>
+          <a:r>
+            <a:rPr lang="en-US" dirty="0" smtClean="0"/>
+            <a:t>Loader</a:t>
+          </a:r>
+          <a:endParaRPr lang="en-US" dirty="0"/>
+        </a:p>
+      </dgm:t>
+    </dgm:pt>
+    <dgm:pt modelId="{EE41B318-12E4-415F-A880-683B5B9BB372}" type="parTrans" cxnId="{8E4A03BC-9967-4011-B180-1BC746E56E32}">
+      <dgm:prSet/>
+      <dgm:spPr/>
+      <dgm:t>
+        <a:bodyPr/>
+        <a:lstStyle/>
+        <a:p>
+          <a:endParaRPr lang="en-US"/>
+        </a:p>
+      </dgm:t>
+    </dgm:pt>
+    <dgm:pt modelId="{002C93FE-9168-49EB-B1B9-277DFFC54BFB}" type="sibTrans" cxnId="{8E4A03BC-9967-4011-B180-1BC746E56E32}">
+      <dgm:prSet/>
+      <dgm:spPr/>
+      <dgm:t>
+        <a:bodyPr/>
+        <a:lstStyle/>
+        <a:p>
+          <a:endParaRPr lang="en-US"/>
+        </a:p>
+      </dgm:t>
+    </dgm:pt>
+    <dgm:pt modelId="{3DD76F5F-C65B-4346-8B76-FA4379234A03}">
+      <dgm:prSet phldrT="[Text]"/>
+      <dgm:spPr/>
+      <dgm:t>
+        <a:bodyPr/>
+        <a:lstStyle/>
+        <a:p>
+          <a:r>
+            <a:rPr lang="en-US" dirty="0" smtClean="0"/>
+            <a:t>Output</a:t>
+          </a:r>
+          <a:endParaRPr lang="en-US" dirty="0"/>
+        </a:p>
+      </dgm:t>
+    </dgm:pt>
+    <dgm:pt modelId="{AD6B39B9-1CB4-421C-BB87-BE383D0AD3BF}" type="parTrans" cxnId="{B1267678-A808-45DB-A867-513E84F49F3C}">
+      <dgm:prSet/>
+      <dgm:spPr/>
+      <dgm:t>
+        <a:bodyPr/>
+        <a:lstStyle/>
+        <a:p>
+          <a:endParaRPr lang="en-US"/>
+        </a:p>
+      </dgm:t>
+    </dgm:pt>
+    <dgm:pt modelId="{D249CC23-2E67-43B7-A48F-FAAAFA04572F}" type="sibTrans" cxnId="{B1267678-A808-45DB-A867-513E84F49F3C}">
+      <dgm:prSet/>
+      <dgm:spPr/>
+      <dgm:t>
+        <a:bodyPr/>
+        <a:lstStyle/>
+        <a:p>
+          <a:endParaRPr lang="en-US"/>
+        </a:p>
+      </dgm:t>
+    </dgm:pt>
+    <dgm:pt modelId="{E6D2227F-FD6E-45B8-95F3-FDB532E30061}">
+      <dgm:prSet phldrT="[Text]"/>
+      <dgm:spPr/>
+      <dgm:t>
+        <a:bodyPr/>
+        <a:lstStyle/>
+        <a:p>
+          <a:r>
+            <a:rPr lang="en-US" dirty="0" smtClean="0"/>
+            <a:t>Plugin</a:t>
+          </a:r>
+          <a:endParaRPr lang="en-US" dirty="0"/>
+        </a:p>
+      </dgm:t>
+    </dgm:pt>
+    <dgm:pt modelId="{183AC794-2EA1-4AE0-B91B-18C55F59002C}" type="parTrans" cxnId="{4C0D2191-FC08-40E8-B7B6-FE451D5CBE62}">
+      <dgm:prSet/>
+      <dgm:spPr/>
+      <dgm:t>
+        <a:bodyPr/>
+        <a:lstStyle/>
+        <a:p>
+          <a:endParaRPr lang="en-US"/>
+        </a:p>
+      </dgm:t>
+    </dgm:pt>
+    <dgm:pt modelId="{74B15022-6DF7-4FD9-94EE-A9B0B44F6811}" type="sibTrans" cxnId="{4C0D2191-FC08-40E8-B7B6-FE451D5CBE62}">
+      <dgm:prSet/>
+      <dgm:spPr/>
+      <dgm:t>
+        <a:bodyPr/>
+        <a:lstStyle/>
+        <a:p>
+          <a:endParaRPr lang="en-US"/>
+        </a:p>
+      </dgm:t>
+    </dgm:pt>
+    <dgm:pt modelId="{D9D811B2-6C8C-494B-85F5-6573CDFFC928}">
+      <dgm:prSet phldrT="[Text]"/>
+      <dgm:spPr/>
+      <dgm:t>
+        <a:bodyPr/>
+        <a:lstStyle/>
+        <a:p>
+          <a:r>
+            <a:rPr lang="en-US" dirty="0" smtClean="0"/>
+            <a:t>Entry</a:t>
+          </a:r>
+          <a:endParaRPr lang="en-US" dirty="0"/>
+        </a:p>
+      </dgm:t>
+    </dgm:pt>
+    <dgm:pt modelId="{C5326E65-86C5-4160-9453-6779E32137B5}" type="parTrans" cxnId="{20ED88C7-F220-4F9D-85E7-00B26615E204}">
+      <dgm:prSet/>
+      <dgm:spPr/>
+      <dgm:t>
+        <a:bodyPr/>
+        <a:lstStyle/>
+        <a:p>
+          <a:endParaRPr lang="en-US"/>
+        </a:p>
+      </dgm:t>
+    </dgm:pt>
+    <dgm:pt modelId="{FCCB1010-8E27-4150-8664-0EA8D82C32A6}" type="sibTrans" cxnId="{20ED88C7-F220-4F9D-85E7-00B26615E204}">
+      <dgm:prSet/>
+      <dgm:spPr/>
+      <dgm:t>
+        <a:bodyPr/>
+        <a:lstStyle/>
+        <a:p>
+          <a:endParaRPr lang="en-US"/>
+        </a:p>
+      </dgm:t>
+    </dgm:pt>
+    <dgm:pt modelId="{E15E72D6-189D-4FE6-A285-F5AA0B09198F}" type="pres">
+      <dgm:prSet presAssocID="{E8DA5A7A-97A7-4595-B185-F93D7B7E8784}" presName="composite" presStyleCnt="0">
+        <dgm:presLayoutVars>
+          <dgm:chMax val="1"/>
+          <dgm:dir/>
+          <dgm:resizeHandles val="exact"/>
+        </dgm:presLayoutVars>
+      </dgm:prSet>
+      <dgm:spPr/>
+    </dgm:pt>
+    <dgm:pt modelId="{22BFA378-C8CE-4F03-A590-F5A19B96BED9}" type="pres">
+      <dgm:prSet presAssocID="{E8DA5A7A-97A7-4595-B185-F93D7B7E8784}" presName="radial" presStyleCnt="0">
+        <dgm:presLayoutVars>
+          <dgm:animLvl val="ctr"/>
+        </dgm:presLayoutVars>
+      </dgm:prSet>
+      <dgm:spPr/>
+    </dgm:pt>
+    <dgm:pt modelId="{F25E8893-72F7-46BF-B9A9-440728380B93}" type="pres">
+      <dgm:prSet presAssocID="{09BE3C5E-06CA-4214-BBBF-B55E9EAA87DA}" presName="centerShape" presStyleLbl="vennNode1" presStyleIdx="0" presStyleCnt="5"/>
+      <dgm:spPr/>
+      <dgm:t>
+        <a:bodyPr/>
+        <a:lstStyle/>
+        <a:p>
+          <a:endParaRPr lang="en-US"/>
+        </a:p>
+      </dgm:t>
+    </dgm:pt>
+    <dgm:pt modelId="{0DE61263-12C6-4F99-ACE2-D94C5C328DCA}" type="pres">
+      <dgm:prSet presAssocID="{82C97B19-D202-4F11-A8FA-439EE7571F26}" presName="node" presStyleLbl="vennNode1" presStyleIdx="1" presStyleCnt="5">
+        <dgm:presLayoutVars>
+          <dgm:bulletEnabled val="1"/>
+        </dgm:presLayoutVars>
+      </dgm:prSet>
+      <dgm:spPr/>
+      <dgm:t>
+        <a:bodyPr/>
+        <a:lstStyle/>
+        <a:p>
+          <a:endParaRPr lang="en-US"/>
+        </a:p>
+      </dgm:t>
+    </dgm:pt>
+    <dgm:pt modelId="{B130DF22-F8DF-44AD-9D84-603F76112B73}" type="pres">
+      <dgm:prSet presAssocID="{3DD76F5F-C65B-4346-8B76-FA4379234A03}" presName="node" presStyleLbl="vennNode1" presStyleIdx="2" presStyleCnt="5">
+        <dgm:presLayoutVars>
+          <dgm:bulletEnabled val="1"/>
+        </dgm:presLayoutVars>
+      </dgm:prSet>
+      <dgm:spPr/>
+      <dgm:t>
+        <a:bodyPr/>
+        <a:lstStyle/>
+        <a:p>
+          <a:endParaRPr lang="en-US"/>
+        </a:p>
+      </dgm:t>
+    </dgm:pt>
+    <dgm:pt modelId="{EF2809AD-EDF3-4D87-AB00-358A6349D535}" type="pres">
+      <dgm:prSet presAssocID="{E6D2227F-FD6E-45B8-95F3-FDB532E30061}" presName="node" presStyleLbl="vennNode1" presStyleIdx="3" presStyleCnt="5">
+        <dgm:presLayoutVars>
+          <dgm:bulletEnabled val="1"/>
+        </dgm:presLayoutVars>
+      </dgm:prSet>
+      <dgm:spPr/>
+    </dgm:pt>
+    <dgm:pt modelId="{00FAA4F4-CE80-4547-A82F-22F79CA1B71F}" type="pres">
+      <dgm:prSet presAssocID="{D9D811B2-6C8C-494B-85F5-6573CDFFC928}" presName="node" presStyleLbl="vennNode1" presStyleIdx="4" presStyleCnt="5">
+        <dgm:presLayoutVars>
+          <dgm:bulletEnabled val="1"/>
+        </dgm:presLayoutVars>
+      </dgm:prSet>
+      <dgm:spPr/>
+    </dgm:pt>
+  </dgm:ptLst>
+  <dgm:cxnLst>
+    <dgm:cxn modelId="{D1ECDB96-566D-4921-82EF-CC82EED0895C}" type="presOf" srcId="{82C97B19-D202-4F11-A8FA-439EE7571F26}" destId="{0DE61263-12C6-4F99-ACE2-D94C5C328DCA}" srcOrd="0" destOrd="0" presId="urn:microsoft.com/office/officeart/2005/8/layout/radial3"/>
+    <dgm:cxn modelId="{C1086FED-A7C6-4444-9081-2DC9EBE2E037}" type="presOf" srcId="{3DD76F5F-C65B-4346-8B76-FA4379234A03}" destId="{B130DF22-F8DF-44AD-9D84-603F76112B73}" srcOrd="0" destOrd="0" presId="urn:microsoft.com/office/officeart/2005/8/layout/radial3"/>
+    <dgm:cxn modelId="{DEC51BE1-3F69-4B66-B230-F1421950D8C1}" type="presOf" srcId="{D9D811B2-6C8C-494B-85F5-6573CDFFC928}" destId="{00FAA4F4-CE80-4547-A82F-22F79CA1B71F}" srcOrd="0" destOrd="0" presId="urn:microsoft.com/office/officeart/2005/8/layout/radial3"/>
+    <dgm:cxn modelId="{51227EA3-7D43-4754-9634-AF710FB40CE7}" type="presOf" srcId="{E8DA5A7A-97A7-4595-B185-F93D7B7E8784}" destId="{E15E72D6-189D-4FE6-A285-F5AA0B09198F}" srcOrd="0" destOrd="0" presId="urn:microsoft.com/office/officeart/2005/8/layout/radial3"/>
+    <dgm:cxn modelId="{4027A09B-6610-46E1-BA35-137FA98BB520}" type="presOf" srcId="{09BE3C5E-06CA-4214-BBBF-B55E9EAA87DA}" destId="{F25E8893-72F7-46BF-B9A9-440728380B93}" srcOrd="0" destOrd="0" presId="urn:microsoft.com/office/officeart/2005/8/layout/radial3"/>
+    <dgm:cxn modelId="{210D3B8B-B85A-4687-9AF7-847C9CBE0CBD}" srcId="{E8DA5A7A-97A7-4595-B185-F93D7B7E8784}" destId="{09BE3C5E-06CA-4214-BBBF-B55E9EAA87DA}" srcOrd="0" destOrd="0" parTransId="{E15746A0-7C12-4BE7-9638-148E267912EE}" sibTransId="{94849A0B-41A7-4CE2-9F22-F4525FA66A83}"/>
+    <dgm:cxn modelId="{B1267678-A808-45DB-A867-513E84F49F3C}" srcId="{09BE3C5E-06CA-4214-BBBF-B55E9EAA87DA}" destId="{3DD76F5F-C65B-4346-8B76-FA4379234A03}" srcOrd="1" destOrd="0" parTransId="{AD6B39B9-1CB4-421C-BB87-BE383D0AD3BF}" sibTransId="{D249CC23-2E67-43B7-A48F-FAAAFA04572F}"/>
+    <dgm:cxn modelId="{8E4A03BC-9967-4011-B180-1BC746E56E32}" srcId="{09BE3C5E-06CA-4214-BBBF-B55E9EAA87DA}" destId="{82C97B19-D202-4F11-A8FA-439EE7571F26}" srcOrd="0" destOrd="0" parTransId="{EE41B318-12E4-415F-A880-683B5B9BB372}" sibTransId="{002C93FE-9168-49EB-B1B9-277DFFC54BFB}"/>
+    <dgm:cxn modelId="{34724687-7B23-483C-B94E-0327DACE8966}" type="presOf" srcId="{E6D2227F-FD6E-45B8-95F3-FDB532E30061}" destId="{EF2809AD-EDF3-4D87-AB00-358A6349D535}" srcOrd="0" destOrd="0" presId="urn:microsoft.com/office/officeart/2005/8/layout/radial3"/>
+    <dgm:cxn modelId="{20ED88C7-F220-4F9D-85E7-00B26615E204}" srcId="{09BE3C5E-06CA-4214-BBBF-B55E9EAA87DA}" destId="{D9D811B2-6C8C-494B-85F5-6573CDFFC928}" srcOrd="3" destOrd="0" parTransId="{C5326E65-86C5-4160-9453-6779E32137B5}" sibTransId="{FCCB1010-8E27-4150-8664-0EA8D82C32A6}"/>
+    <dgm:cxn modelId="{4C0D2191-FC08-40E8-B7B6-FE451D5CBE62}" srcId="{09BE3C5E-06CA-4214-BBBF-B55E9EAA87DA}" destId="{E6D2227F-FD6E-45B8-95F3-FDB532E30061}" srcOrd="2" destOrd="0" parTransId="{183AC794-2EA1-4AE0-B91B-18C55F59002C}" sibTransId="{74B15022-6DF7-4FD9-94EE-A9B0B44F6811}"/>
+    <dgm:cxn modelId="{4FCB0979-79FA-4A0B-9B53-9B30765DCE99}" type="presParOf" srcId="{E15E72D6-189D-4FE6-A285-F5AA0B09198F}" destId="{22BFA378-C8CE-4F03-A590-F5A19B96BED9}" srcOrd="0" destOrd="0" presId="urn:microsoft.com/office/officeart/2005/8/layout/radial3"/>
+    <dgm:cxn modelId="{F83F2640-7FF7-426E-9FA0-D8ADE4110F1F}" type="presParOf" srcId="{22BFA378-C8CE-4F03-A590-F5A19B96BED9}" destId="{F25E8893-72F7-46BF-B9A9-440728380B93}" srcOrd="0" destOrd="0" presId="urn:microsoft.com/office/officeart/2005/8/layout/radial3"/>
+    <dgm:cxn modelId="{62056E1B-5232-4863-AC58-2717B852A420}" type="presParOf" srcId="{22BFA378-C8CE-4F03-A590-F5A19B96BED9}" destId="{0DE61263-12C6-4F99-ACE2-D94C5C328DCA}" srcOrd="1" destOrd="0" presId="urn:microsoft.com/office/officeart/2005/8/layout/radial3"/>
+    <dgm:cxn modelId="{E907A0AE-67AB-4D81-A429-D43BFB5B8EF4}" type="presParOf" srcId="{22BFA378-C8CE-4F03-A590-F5A19B96BED9}" destId="{B130DF22-F8DF-44AD-9D84-603F76112B73}" srcOrd="2" destOrd="0" presId="urn:microsoft.com/office/officeart/2005/8/layout/radial3"/>
+    <dgm:cxn modelId="{02087AAA-FECE-4CAE-A86C-1B9BD93A7480}" type="presParOf" srcId="{22BFA378-C8CE-4F03-A590-F5A19B96BED9}" destId="{EF2809AD-EDF3-4D87-AB00-358A6349D535}" srcOrd="3" destOrd="0" presId="urn:microsoft.com/office/officeart/2005/8/layout/radial3"/>
+    <dgm:cxn modelId="{63275D67-4C57-4B4D-8F1D-C9D7D68C1A24}" type="presParOf" srcId="{22BFA378-C8CE-4F03-A590-F5A19B96BED9}" destId="{00FAA4F4-CE80-4547-A82F-22F79CA1B71F}" srcOrd="4" destOrd="0" presId="urn:microsoft.com/office/officeart/2005/8/layout/radial3"/>
   </dgm:cxnLst>
   <dgm:bg/>
   <dgm:whole/>
@@ -1605,6 +2660,563 @@
 </dsp:drawing>
 </file>
 
+<file path=ppt/diagrams/drawing2.xml><?xml version="1.0" encoding="utf-8"?>
+<dsp:drawing xmlns:dgm="http://schemas.openxmlformats.org/drawingml/2006/diagram" xmlns:dsp="http://schemas.microsoft.com/office/drawing/2008/diagram" xmlns:a="http://schemas.openxmlformats.org/drawingml/2006/main">
+  <dsp:spTree>
+    <dsp:nvGrpSpPr>
+      <dsp:cNvPr id="0" name=""/>
+      <dsp:cNvGrpSpPr/>
+    </dsp:nvGrpSpPr>
+    <dsp:grpSpPr/>
+    <dsp:sp modelId="{F25E8893-72F7-46BF-B9A9-440728380B93}">
+      <dsp:nvSpPr>
+        <dsp:cNvPr id="0" name=""/>
+        <dsp:cNvSpPr/>
+      </dsp:nvSpPr>
+      <dsp:spPr>
+        <a:xfrm>
+          <a:off x="4092723" y="800248"/>
+          <a:ext cx="1993602" cy="1993602"/>
+        </a:xfrm>
+        <a:prstGeom prst="ellipse">
+          <a:avLst/>
+        </a:prstGeom>
+        <a:gradFill rotWithShape="0">
+          <a:gsLst>
+            <a:gs pos="0">
+              <a:schemeClr val="accent1">
+                <a:alpha val="50000"/>
+                <a:hueOff val="0"/>
+                <a:satOff val="0"/>
+                <a:lumOff val="0"/>
+                <a:alphaOff val="0"/>
+                <a:tint val="67000"/>
+                <a:satMod val="105000"/>
+                <a:lumMod val="110000"/>
+              </a:schemeClr>
+            </a:gs>
+            <a:gs pos="50000">
+              <a:schemeClr val="accent1">
+                <a:alpha val="50000"/>
+                <a:hueOff val="0"/>
+                <a:satOff val="0"/>
+                <a:lumOff val="0"/>
+                <a:alphaOff val="0"/>
+                <a:tint val="73000"/>
+                <a:satMod val="103000"/>
+                <a:lumMod val="105000"/>
+              </a:schemeClr>
+            </a:gs>
+            <a:gs pos="100000">
+              <a:schemeClr val="accent1">
+                <a:alpha val="50000"/>
+                <a:hueOff val="0"/>
+                <a:satOff val="0"/>
+                <a:lumOff val="0"/>
+                <a:alphaOff val="0"/>
+                <a:tint val="81000"/>
+                <a:satMod val="109000"/>
+                <a:lumMod val="105000"/>
+              </a:schemeClr>
+            </a:gs>
+          </a:gsLst>
+          <a:lin ang="5400000" scaled="0"/>
+        </a:gradFill>
+        <a:ln>
+          <a:noFill/>
+        </a:ln>
+        <a:effectLst/>
+        <a:scene3d>
+          <a:camera prst="orthographicFront"/>
+          <a:lightRig rig="flat" dir="t"/>
+        </a:scene3d>
+        <a:sp3d prstMaterial="dkEdge">
+          <a:bevelT w="8200" h="38100"/>
+        </a:sp3d>
+      </dsp:spPr>
+      <dsp:style>
+        <a:lnRef idx="0">
+          <a:scrgbClr r="0" g="0" b="0"/>
+        </a:lnRef>
+        <a:fillRef idx="2">
+          <a:scrgbClr r="0" g="0" b="0"/>
+        </a:fillRef>
+        <a:effectRef idx="0">
+          <a:scrgbClr r="0" g="0" b="0"/>
+        </a:effectRef>
+        <a:fontRef idx="minor">
+          <a:schemeClr val="tx1"/>
+        </a:fontRef>
+      </dsp:style>
+      <dsp:txBody>
+        <a:bodyPr spcFirstLastPara="0" vert="horz" wrap="square" lIns="30480" tIns="30480" rIns="30480" bIns="30480" numCol="1" spcCol="1270" anchor="ctr" anchorCtr="0">
+          <a:noAutofit/>
+        </a:bodyPr>
+        <a:lstStyle/>
+        <a:p>
+          <a:pPr lvl="0" algn="ctr" defTabSz="1066800">
+            <a:lnSpc>
+              <a:spcPct val="90000"/>
+            </a:lnSpc>
+            <a:spcBef>
+              <a:spcPct val="0"/>
+            </a:spcBef>
+            <a:spcAft>
+              <a:spcPct val="35000"/>
+            </a:spcAft>
+          </a:pPr>
+          <a:r>
+            <a:rPr lang="en-US" sz="2400" kern="1200" dirty="0" err="1" smtClean="0"/>
+            <a:t>WebPack</a:t>
+          </a:r>
+          <a:endParaRPr lang="en-US" sz="2400" kern="1200" dirty="0"/>
+        </a:p>
+      </dsp:txBody>
+      <dsp:txXfrm>
+        <a:off x="4384679" y="1092204"/>
+        <a:ext cx="1409690" cy="1409690"/>
+      </dsp:txXfrm>
+    </dsp:sp>
+    <dsp:sp modelId="{0DE61263-12C6-4F99-ACE2-D94C5C328DCA}">
+      <dsp:nvSpPr>
+        <dsp:cNvPr id="0" name=""/>
+        <dsp:cNvSpPr/>
+      </dsp:nvSpPr>
+      <dsp:spPr>
+        <a:xfrm>
+          <a:off x="4591124" y="355"/>
+          <a:ext cx="996801" cy="996801"/>
+        </a:xfrm>
+        <a:prstGeom prst="ellipse">
+          <a:avLst/>
+        </a:prstGeom>
+        <a:gradFill rotWithShape="0">
+          <a:gsLst>
+            <a:gs pos="0">
+              <a:schemeClr val="accent1">
+                <a:alpha val="50000"/>
+                <a:hueOff val="0"/>
+                <a:satOff val="0"/>
+                <a:lumOff val="0"/>
+                <a:alphaOff val="0"/>
+                <a:tint val="67000"/>
+                <a:satMod val="105000"/>
+                <a:lumMod val="110000"/>
+              </a:schemeClr>
+            </a:gs>
+            <a:gs pos="50000">
+              <a:schemeClr val="accent1">
+                <a:alpha val="50000"/>
+                <a:hueOff val="0"/>
+                <a:satOff val="0"/>
+                <a:lumOff val="0"/>
+                <a:alphaOff val="0"/>
+                <a:tint val="73000"/>
+                <a:satMod val="103000"/>
+                <a:lumMod val="105000"/>
+              </a:schemeClr>
+            </a:gs>
+            <a:gs pos="100000">
+              <a:schemeClr val="accent1">
+                <a:alpha val="50000"/>
+                <a:hueOff val="0"/>
+                <a:satOff val="0"/>
+                <a:lumOff val="0"/>
+                <a:alphaOff val="0"/>
+                <a:tint val="81000"/>
+                <a:satMod val="109000"/>
+                <a:lumMod val="105000"/>
+              </a:schemeClr>
+            </a:gs>
+          </a:gsLst>
+          <a:lin ang="5400000" scaled="0"/>
+        </a:gradFill>
+        <a:ln>
+          <a:noFill/>
+        </a:ln>
+        <a:effectLst/>
+        <a:scene3d>
+          <a:camera prst="orthographicFront"/>
+          <a:lightRig rig="flat" dir="t"/>
+        </a:scene3d>
+        <a:sp3d prstMaterial="dkEdge">
+          <a:bevelT w="8200" h="38100"/>
+        </a:sp3d>
+      </dsp:spPr>
+      <dsp:style>
+        <a:lnRef idx="0">
+          <a:scrgbClr r="0" g="0" b="0"/>
+        </a:lnRef>
+        <a:fillRef idx="2">
+          <a:scrgbClr r="0" g="0" b="0"/>
+        </a:fillRef>
+        <a:effectRef idx="0">
+          <a:scrgbClr r="0" g="0" b="0"/>
+        </a:effectRef>
+        <a:fontRef idx="minor">
+          <a:schemeClr val="tx1"/>
+        </a:fontRef>
+      </dsp:style>
+      <dsp:txBody>
+        <a:bodyPr spcFirstLastPara="0" vert="horz" wrap="square" lIns="20320" tIns="20320" rIns="20320" bIns="20320" numCol="1" spcCol="1270" anchor="ctr" anchorCtr="0">
+          <a:noAutofit/>
+        </a:bodyPr>
+        <a:lstStyle/>
+        <a:p>
+          <a:pPr lvl="0" algn="ctr" defTabSz="711200">
+            <a:lnSpc>
+              <a:spcPct val="90000"/>
+            </a:lnSpc>
+            <a:spcBef>
+              <a:spcPct val="0"/>
+            </a:spcBef>
+            <a:spcAft>
+              <a:spcPct val="35000"/>
+            </a:spcAft>
+          </a:pPr>
+          <a:r>
+            <a:rPr lang="en-US" sz="1600" kern="1200" dirty="0" smtClean="0"/>
+            <a:t>Loader</a:t>
+          </a:r>
+          <a:endParaRPr lang="en-US" sz="1600" kern="1200" dirty="0"/>
+        </a:p>
+      </dsp:txBody>
+      <dsp:txXfrm>
+        <a:off x="4737102" y="146333"/>
+        <a:ext cx="704845" cy="704845"/>
+      </dsp:txXfrm>
+    </dsp:sp>
+    <dsp:sp modelId="{B130DF22-F8DF-44AD-9D84-603F76112B73}">
+      <dsp:nvSpPr>
+        <dsp:cNvPr id="0" name=""/>
+        <dsp:cNvSpPr/>
+      </dsp:nvSpPr>
+      <dsp:spPr>
+        <a:xfrm>
+          <a:off x="5889417" y="1298649"/>
+          <a:ext cx="996801" cy="996801"/>
+        </a:xfrm>
+        <a:prstGeom prst="ellipse">
+          <a:avLst/>
+        </a:prstGeom>
+        <a:gradFill rotWithShape="0">
+          <a:gsLst>
+            <a:gs pos="0">
+              <a:schemeClr val="accent1">
+                <a:alpha val="50000"/>
+                <a:hueOff val="0"/>
+                <a:satOff val="0"/>
+                <a:lumOff val="0"/>
+                <a:alphaOff val="0"/>
+                <a:tint val="67000"/>
+                <a:satMod val="105000"/>
+                <a:lumMod val="110000"/>
+              </a:schemeClr>
+            </a:gs>
+            <a:gs pos="50000">
+              <a:schemeClr val="accent1">
+                <a:alpha val="50000"/>
+                <a:hueOff val="0"/>
+                <a:satOff val="0"/>
+                <a:lumOff val="0"/>
+                <a:alphaOff val="0"/>
+                <a:tint val="73000"/>
+                <a:satMod val="103000"/>
+                <a:lumMod val="105000"/>
+              </a:schemeClr>
+            </a:gs>
+            <a:gs pos="100000">
+              <a:schemeClr val="accent1">
+                <a:alpha val="50000"/>
+                <a:hueOff val="0"/>
+                <a:satOff val="0"/>
+                <a:lumOff val="0"/>
+                <a:alphaOff val="0"/>
+                <a:tint val="81000"/>
+                <a:satMod val="109000"/>
+                <a:lumMod val="105000"/>
+              </a:schemeClr>
+            </a:gs>
+          </a:gsLst>
+          <a:lin ang="5400000" scaled="0"/>
+        </a:gradFill>
+        <a:ln>
+          <a:noFill/>
+        </a:ln>
+        <a:effectLst/>
+        <a:scene3d>
+          <a:camera prst="orthographicFront"/>
+          <a:lightRig rig="flat" dir="t"/>
+        </a:scene3d>
+        <a:sp3d prstMaterial="dkEdge">
+          <a:bevelT w="8200" h="38100"/>
+        </a:sp3d>
+      </dsp:spPr>
+      <dsp:style>
+        <a:lnRef idx="0">
+          <a:scrgbClr r="0" g="0" b="0"/>
+        </a:lnRef>
+        <a:fillRef idx="2">
+          <a:scrgbClr r="0" g="0" b="0"/>
+        </a:fillRef>
+        <a:effectRef idx="0">
+          <a:scrgbClr r="0" g="0" b="0"/>
+        </a:effectRef>
+        <a:fontRef idx="minor">
+          <a:schemeClr val="tx1"/>
+        </a:fontRef>
+      </dsp:style>
+      <dsp:txBody>
+        <a:bodyPr spcFirstLastPara="0" vert="horz" wrap="square" lIns="20320" tIns="20320" rIns="20320" bIns="20320" numCol="1" spcCol="1270" anchor="ctr" anchorCtr="0">
+          <a:noAutofit/>
+        </a:bodyPr>
+        <a:lstStyle/>
+        <a:p>
+          <a:pPr lvl="0" algn="ctr" defTabSz="711200">
+            <a:lnSpc>
+              <a:spcPct val="90000"/>
+            </a:lnSpc>
+            <a:spcBef>
+              <a:spcPct val="0"/>
+            </a:spcBef>
+            <a:spcAft>
+              <a:spcPct val="35000"/>
+            </a:spcAft>
+          </a:pPr>
+          <a:r>
+            <a:rPr lang="en-US" sz="1600" kern="1200" dirty="0" smtClean="0"/>
+            <a:t>Output</a:t>
+          </a:r>
+          <a:endParaRPr lang="en-US" sz="1600" kern="1200" dirty="0"/>
+        </a:p>
+      </dsp:txBody>
+      <dsp:txXfrm>
+        <a:off x="6035395" y="1444627"/>
+        <a:ext cx="704845" cy="704845"/>
+      </dsp:txXfrm>
+    </dsp:sp>
+    <dsp:sp modelId="{EF2809AD-EDF3-4D87-AB00-358A6349D535}">
+      <dsp:nvSpPr>
+        <dsp:cNvPr id="0" name=""/>
+        <dsp:cNvSpPr/>
+      </dsp:nvSpPr>
+      <dsp:spPr>
+        <a:xfrm>
+          <a:off x="4591124" y="2596942"/>
+          <a:ext cx="996801" cy="996801"/>
+        </a:xfrm>
+        <a:prstGeom prst="ellipse">
+          <a:avLst/>
+        </a:prstGeom>
+        <a:gradFill rotWithShape="0">
+          <a:gsLst>
+            <a:gs pos="0">
+              <a:schemeClr val="accent1">
+                <a:alpha val="50000"/>
+                <a:hueOff val="0"/>
+                <a:satOff val="0"/>
+                <a:lumOff val="0"/>
+                <a:alphaOff val="0"/>
+                <a:tint val="67000"/>
+                <a:satMod val="105000"/>
+                <a:lumMod val="110000"/>
+              </a:schemeClr>
+            </a:gs>
+            <a:gs pos="50000">
+              <a:schemeClr val="accent1">
+                <a:alpha val="50000"/>
+                <a:hueOff val="0"/>
+                <a:satOff val="0"/>
+                <a:lumOff val="0"/>
+                <a:alphaOff val="0"/>
+                <a:tint val="73000"/>
+                <a:satMod val="103000"/>
+                <a:lumMod val="105000"/>
+              </a:schemeClr>
+            </a:gs>
+            <a:gs pos="100000">
+              <a:schemeClr val="accent1">
+                <a:alpha val="50000"/>
+                <a:hueOff val="0"/>
+                <a:satOff val="0"/>
+                <a:lumOff val="0"/>
+                <a:alphaOff val="0"/>
+                <a:tint val="81000"/>
+                <a:satMod val="109000"/>
+                <a:lumMod val="105000"/>
+              </a:schemeClr>
+            </a:gs>
+          </a:gsLst>
+          <a:lin ang="5400000" scaled="0"/>
+        </a:gradFill>
+        <a:ln>
+          <a:noFill/>
+        </a:ln>
+        <a:effectLst/>
+        <a:scene3d>
+          <a:camera prst="orthographicFront"/>
+          <a:lightRig rig="flat" dir="t"/>
+        </a:scene3d>
+        <a:sp3d prstMaterial="dkEdge">
+          <a:bevelT w="8200" h="38100"/>
+        </a:sp3d>
+      </dsp:spPr>
+      <dsp:style>
+        <a:lnRef idx="0">
+          <a:scrgbClr r="0" g="0" b="0"/>
+        </a:lnRef>
+        <a:fillRef idx="2">
+          <a:scrgbClr r="0" g="0" b="0"/>
+        </a:fillRef>
+        <a:effectRef idx="0">
+          <a:scrgbClr r="0" g="0" b="0"/>
+        </a:effectRef>
+        <a:fontRef idx="minor">
+          <a:schemeClr val="tx1"/>
+        </a:fontRef>
+      </dsp:style>
+      <dsp:txBody>
+        <a:bodyPr spcFirstLastPara="0" vert="horz" wrap="square" lIns="20320" tIns="20320" rIns="20320" bIns="20320" numCol="1" spcCol="1270" anchor="ctr" anchorCtr="0">
+          <a:noAutofit/>
+        </a:bodyPr>
+        <a:lstStyle/>
+        <a:p>
+          <a:pPr lvl="0" algn="ctr" defTabSz="711200">
+            <a:lnSpc>
+              <a:spcPct val="90000"/>
+            </a:lnSpc>
+            <a:spcBef>
+              <a:spcPct val="0"/>
+            </a:spcBef>
+            <a:spcAft>
+              <a:spcPct val="35000"/>
+            </a:spcAft>
+          </a:pPr>
+          <a:r>
+            <a:rPr lang="en-US" sz="1600" kern="1200" dirty="0" smtClean="0"/>
+            <a:t>Plugin</a:t>
+          </a:r>
+          <a:endParaRPr lang="en-US" sz="1600" kern="1200" dirty="0"/>
+        </a:p>
+      </dsp:txBody>
+      <dsp:txXfrm>
+        <a:off x="4737102" y="2742920"/>
+        <a:ext cx="704845" cy="704845"/>
+      </dsp:txXfrm>
+    </dsp:sp>
+    <dsp:sp modelId="{00FAA4F4-CE80-4547-A82F-22F79CA1B71F}">
+      <dsp:nvSpPr>
+        <dsp:cNvPr id="0" name=""/>
+        <dsp:cNvSpPr/>
+      </dsp:nvSpPr>
+      <dsp:spPr>
+        <a:xfrm>
+          <a:off x="3292830" y="1298649"/>
+          <a:ext cx="996801" cy="996801"/>
+        </a:xfrm>
+        <a:prstGeom prst="ellipse">
+          <a:avLst/>
+        </a:prstGeom>
+        <a:gradFill rotWithShape="0">
+          <a:gsLst>
+            <a:gs pos="0">
+              <a:schemeClr val="accent1">
+                <a:alpha val="50000"/>
+                <a:hueOff val="0"/>
+                <a:satOff val="0"/>
+                <a:lumOff val="0"/>
+                <a:alphaOff val="0"/>
+                <a:tint val="67000"/>
+                <a:satMod val="105000"/>
+                <a:lumMod val="110000"/>
+              </a:schemeClr>
+            </a:gs>
+            <a:gs pos="50000">
+              <a:schemeClr val="accent1">
+                <a:alpha val="50000"/>
+                <a:hueOff val="0"/>
+                <a:satOff val="0"/>
+                <a:lumOff val="0"/>
+                <a:alphaOff val="0"/>
+                <a:tint val="73000"/>
+                <a:satMod val="103000"/>
+                <a:lumMod val="105000"/>
+              </a:schemeClr>
+            </a:gs>
+            <a:gs pos="100000">
+              <a:schemeClr val="accent1">
+                <a:alpha val="50000"/>
+                <a:hueOff val="0"/>
+                <a:satOff val="0"/>
+                <a:lumOff val="0"/>
+                <a:alphaOff val="0"/>
+                <a:tint val="81000"/>
+                <a:satMod val="109000"/>
+                <a:lumMod val="105000"/>
+              </a:schemeClr>
+            </a:gs>
+          </a:gsLst>
+          <a:lin ang="5400000" scaled="0"/>
+        </a:gradFill>
+        <a:ln>
+          <a:noFill/>
+        </a:ln>
+        <a:effectLst/>
+        <a:scene3d>
+          <a:camera prst="orthographicFront"/>
+          <a:lightRig rig="flat" dir="t"/>
+        </a:scene3d>
+        <a:sp3d prstMaterial="dkEdge">
+          <a:bevelT w="8200" h="38100"/>
+        </a:sp3d>
+      </dsp:spPr>
+      <dsp:style>
+        <a:lnRef idx="0">
+          <a:scrgbClr r="0" g="0" b="0"/>
+        </a:lnRef>
+        <a:fillRef idx="2">
+          <a:scrgbClr r="0" g="0" b="0"/>
+        </a:fillRef>
+        <a:effectRef idx="0">
+          <a:scrgbClr r="0" g="0" b="0"/>
+        </a:effectRef>
+        <a:fontRef idx="minor">
+          <a:schemeClr val="tx1"/>
+        </a:fontRef>
+      </dsp:style>
+      <dsp:txBody>
+        <a:bodyPr spcFirstLastPara="0" vert="horz" wrap="square" lIns="20320" tIns="20320" rIns="20320" bIns="20320" numCol="1" spcCol="1270" anchor="ctr" anchorCtr="0">
+          <a:noAutofit/>
+        </a:bodyPr>
+        <a:lstStyle/>
+        <a:p>
+          <a:pPr lvl="0" algn="ctr" defTabSz="711200">
+            <a:lnSpc>
+              <a:spcPct val="90000"/>
+            </a:lnSpc>
+            <a:spcBef>
+              <a:spcPct val="0"/>
+            </a:spcBef>
+            <a:spcAft>
+              <a:spcPct val="35000"/>
+            </a:spcAft>
+          </a:pPr>
+          <a:r>
+            <a:rPr lang="en-US" sz="1600" kern="1200" dirty="0" smtClean="0"/>
+            <a:t>Entry</a:t>
+          </a:r>
+          <a:endParaRPr lang="en-US" sz="1600" kern="1200" dirty="0"/>
+        </a:p>
+      </dsp:txBody>
+      <dsp:txXfrm>
+        <a:off x="3438808" y="1444627"/>
+        <a:ext cx="704845" cy="704845"/>
+      </dsp:txXfrm>
+    </dsp:sp>
+  </dsp:spTree>
+</dsp:drawing>
+</file>
+
 <file path=ppt/diagrams/layout1.xml><?xml version="1.0" encoding="utf-8"?>
 <dgm:layoutDef xmlns:dgm="http://schemas.openxmlformats.org/drawingml/2006/diagram" xmlns:a="http://schemas.openxmlformats.org/drawingml/2006/main" uniqueId="urn:microsoft.com/office/officeart/2005/8/layout/funnel1">
   <dgm:title val=""/>
@@ -1923,6 +3535,197 @@
 </dgm:layoutDef>
 </file>
 
+<file path=ppt/diagrams/layout2.xml><?xml version="1.0" encoding="utf-8"?>
+<dgm:layoutDef xmlns:dgm="http://schemas.openxmlformats.org/drawingml/2006/diagram" xmlns:a="http://schemas.openxmlformats.org/drawingml/2006/main" uniqueId="urn:microsoft.com/office/officeart/2005/8/layout/radial3">
+  <dgm:title val=""/>
+  <dgm:desc val=""/>
+  <dgm:catLst>
+    <dgm:cat type="relationship" pri="31000"/>
+    <dgm:cat type="cycle" pri="12000"/>
+  </dgm:catLst>
+  <dgm:sampData>
+    <dgm:dataModel>
+      <dgm:ptLst>
+        <dgm:pt modelId="0" type="doc"/>
+        <dgm:pt modelId="1">
+          <dgm:prSet phldr="1"/>
+        </dgm:pt>
+        <dgm:pt modelId="11">
+          <dgm:prSet phldr="1"/>
+        </dgm:pt>
+        <dgm:pt modelId="12">
+          <dgm:prSet phldr="1"/>
+        </dgm:pt>
+        <dgm:pt modelId="13">
+          <dgm:prSet phldr="1"/>
+        </dgm:pt>
+        <dgm:pt modelId="14">
+          <dgm:prSet phldr="1"/>
+        </dgm:pt>
+      </dgm:ptLst>
+      <dgm:cxnLst>
+        <dgm:cxn modelId="2" srcId="0" destId="1" srcOrd="0" destOrd="0"/>
+        <dgm:cxn modelId="3" srcId="1" destId="11" srcOrd="0" destOrd="0"/>
+        <dgm:cxn modelId="4" srcId="1" destId="12" srcOrd="1" destOrd="0"/>
+        <dgm:cxn modelId="5" srcId="1" destId="13" srcOrd="2" destOrd="0"/>
+        <dgm:cxn modelId="6" srcId="1" destId="14" srcOrd="3" destOrd="0"/>
+      </dgm:cxnLst>
+      <dgm:bg/>
+      <dgm:whole/>
+    </dgm:dataModel>
+  </dgm:sampData>
+  <dgm:styleData>
+    <dgm:dataModel>
+      <dgm:ptLst>
+        <dgm:pt modelId="0" type="doc"/>
+        <dgm:pt modelId="1"/>
+        <dgm:pt modelId="11"/>
+        <dgm:pt modelId="12"/>
+        <dgm:pt modelId="13"/>
+      </dgm:ptLst>
+      <dgm:cxnLst>
+        <dgm:cxn modelId="2" srcId="0" destId="1" srcOrd="0" destOrd="0"/>
+        <dgm:cxn modelId="15" srcId="1" destId="11" srcOrd="0" destOrd="0"/>
+        <dgm:cxn modelId="16" srcId="1" destId="12" srcOrd="1" destOrd="0"/>
+        <dgm:cxn modelId="17" srcId="1" destId="13" srcOrd="2" destOrd="0"/>
+      </dgm:cxnLst>
+      <dgm:bg/>
+      <dgm:whole/>
+    </dgm:dataModel>
+  </dgm:styleData>
+  <dgm:clrData>
+    <dgm:dataModel>
+      <dgm:ptLst>
+        <dgm:pt modelId="0" type="doc"/>
+        <dgm:pt modelId="1"/>
+        <dgm:pt modelId="11"/>
+        <dgm:pt modelId="12"/>
+        <dgm:pt modelId="13"/>
+        <dgm:pt modelId="14"/>
+        <dgm:pt modelId="15"/>
+        <dgm:pt modelId="16"/>
+      </dgm:ptLst>
+      <dgm:cxnLst>
+        <dgm:cxn modelId="2" srcId="0" destId="1" srcOrd="0" destOrd="0"/>
+        <dgm:cxn modelId="16" srcId="1" destId="11" srcOrd="0" destOrd="0"/>
+        <dgm:cxn modelId="17" srcId="1" destId="12" srcOrd="1" destOrd="0"/>
+        <dgm:cxn modelId="18" srcId="1" destId="13" srcOrd="2" destOrd="0"/>
+        <dgm:cxn modelId="19" srcId="1" destId="14" srcOrd="3" destOrd="0"/>
+        <dgm:cxn modelId="20" srcId="1" destId="15" srcOrd="4" destOrd="0"/>
+        <dgm:cxn modelId="21" srcId="1" destId="16" srcOrd="5" destOrd="0"/>
+      </dgm:cxnLst>
+      <dgm:bg/>
+      <dgm:whole/>
+    </dgm:dataModel>
+  </dgm:clrData>
+  <dgm:layoutNode name="composite">
+    <dgm:varLst>
+      <dgm:chMax val="1"/>
+      <dgm:dir/>
+      <dgm:resizeHandles val="exact"/>
+    </dgm:varLst>
+    <dgm:alg type="composite">
+      <dgm:param type="ar" val="1"/>
+    </dgm:alg>
+    <dgm:shape xmlns:r="http://schemas.openxmlformats.org/officeDocument/2006/relationships" r:blip="">
+      <dgm:adjLst/>
+    </dgm:shape>
+    <dgm:presOf/>
+    <dgm:constrLst/>
+    <dgm:ruleLst/>
+    <dgm:layoutNode name="radial">
+      <dgm:varLst>
+        <dgm:animLvl val="ctr"/>
+      </dgm:varLst>
+      <dgm:choose name="Name0">
+        <dgm:if name="Name1" func="var" arg="dir" op="equ" val="norm">
+          <dgm:choose name="Name2">
+            <dgm:if name="Name3" axis="ch ch" ptType="node node" st="1 1" cnt="1 0" func="cnt" op="lte" val="1">
+              <dgm:alg type="cycle">
+                <dgm:param type="stAng" val="90"/>
+                <dgm:param type="spanAng" val="360"/>
+                <dgm:param type="ctrShpMap" val="fNode"/>
+              </dgm:alg>
+            </dgm:if>
+            <dgm:else name="Name4">
+              <dgm:alg type="cycle">
+                <dgm:param type="stAng" val="0"/>
+                <dgm:param type="spanAng" val="360"/>
+                <dgm:param type="ctrShpMap" val="fNode"/>
+              </dgm:alg>
+            </dgm:else>
+          </dgm:choose>
+        </dgm:if>
+        <dgm:else name="Name5">
+          <dgm:alg type="cycle">
+            <dgm:param type="stAng" val="0"/>
+            <dgm:param type="spanAng" val="-360"/>
+            <dgm:param type="ctrShpMap" val="fNode"/>
+          </dgm:alg>
+        </dgm:else>
+      </dgm:choose>
+      <dgm:shape xmlns:r="http://schemas.openxmlformats.org/officeDocument/2006/relationships" r:blip="">
+        <dgm:adjLst/>
+      </dgm:shape>
+      <dgm:presOf/>
+      <dgm:constrLst>
+        <dgm:constr type="w" for="ch" forName="centerShape" refType="w"/>
+        <dgm:constr type="h" for="ch" forName="centerShape" refType="h"/>
+        <dgm:constr type="w" for="ch" forName="node" refType="w" fact="0.5"/>
+        <dgm:constr type="h" for="ch" forName="node" refType="h" fact="0.5"/>
+        <dgm:constr type="sp" refType="w" refFor="ch" refForName="node" fact="-0.2"/>
+        <dgm:constr type="sibSp" refType="w" refFor="ch" refForName="node" fact="-0.2"/>
+        <dgm:constr type="primFontSz" for="ch" forName="centerShape" val="65"/>
+        <dgm:constr type="primFontSz" for="des" forName="node" val="65"/>
+        <dgm:constr type="primFontSz" for="ch" forName="node" refType="primFontSz" refFor="ch" refForName="centerShape" op="lte"/>
+      </dgm:constrLst>
+      <dgm:ruleLst/>
+      <dgm:forEach name="Name6" axis="ch" ptType="node" cnt="1">
+        <dgm:layoutNode name="centerShape" styleLbl="vennNode1">
+          <dgm:alg type="tx"/>
+          <dgm:shape xmlns:r="http://schemas.openxmlformats.org/officeDocument/2006/relationships" type="ellipse" r:blip="">
+            <dgm:adjLst/>
+          </dgm:shape>
+          <dgm:presOf axis="self"/>
+          <dgm:constrLst>
+            <dgm:constr type="tMarg" refType="primFontSz" fact="0.1"/>
+            <dgm:constr type="bMarg" refType="primFontSz" fact="0.1"/>
+            <dgm:constr type="lMarg" refType="primFontSz" fact="0.1"/>
+            <dgm:constr type="rMarg" refType="primFontSz" fact="0.1"/>
+          </dgm:constrLst>
+          <dgm:ruleLst>
+            <dgm:rule type="primFontSz" val="5" fact="NaN" max="NaN"/>
+          </dgm:ruleLst>
+        </dgm:layoutNode>
+        <dgm:forEach name="Name7" axis="ch" ptType="node">
+          <dgm:layoutNode name="node" styleLbl="vennNode1">
+            <dgm:varLst>
+              <dgm:bulletEnabled val="1"/>
+            </dgm:varLst>
+            <dgm:alg type="tx">
+              <dgm:param type="txAnchorVertCh" val="mid"/>
+            </dgm:alg>
+            <dgm:shape xmlns:r="http://schemas.openxmlformats.org/officeDocument/2006/relationships" type="ellipse" r:blip="">
+              <dgm:adjLst/>
+            </dgm:shape>
+            <dgm:presOf axis="desOrSelf" ptType="node"/>
+            <dgm:constrLst>
+              <dgm:constr type="tMarg" refType="primFontSz" fact="0.1"/>
+              <dgm:constr type="bMarg" refType="primFontSz" fact="0.1"/>
+              <dgm:constr type="lMarg" refType="primFontSz" fact="0.1"/>
+              <dgm:constr type="rMarg" refType="primFontSz" fact="0.1"/>
+            </dgm:constrLst>
+            <dgm:ruleLst>
+              <dgm:rule type="primFontSz" val="5" fact="NaN" max="NaN"/>
+            </dgm:ruleLst>
+          </dgm:layoutNode>
+        </dgm:forEach>
+      </dgm:forEach>
+    </dgm:layoutNode>
+  </dgm:layoutNode>
+</dgm:layoutDef>
+</file>
+
 <file path=ppt/diagrams/quickStyle1.xml><?xml version="1.0" encoding="utf-8"?>
 <dgm:styleDef xmlns:dgm="http://schemas.openxmlformats.org/drawingml/2006/diagram" xmlns:a="http://schemas.openxmlformats.org/drawingml/2006/main" uniqueId="urn:microsoft.com/office/officeart/2005/8/quickstyle/simple1">
   <dgm:title val=""/>
@@ -2929,6 +4732,1066 @@
         <a:scrgbClr r="0" g="0" b="0"/>
       </a:fillRef>
       <a:effectRef idx="0">
+        <a:scrgbClr r="0" g="0" b="0"/>
+      </a:effectRef>
+      <a:fontRef idx="minor"/>
+    </dgm:style>
+  </dgm:styleLbl>
+  <dgm:styleLbl name="revTx">
+    <dgm:scene3d>
+      <a:camera prst="orthographicFront"/>
+      <a:lightRig rig="threePt" dir="t"/>
+    </dgm:scene3d>
+    <dgm:sp3d/>
+    <dgm:txPr/>
+    <dgm:style>
+      <a:lnRef idx="0">
+        <a:scrgbClr r="0" g="0" b="0"/>
+      </a:lnRef>
+      <a:fillRef idx="0">
+        <a:scrgbClr r="0" g="0" b="0"/>
+      </a:fillRef>
+      <a:effectRef idx="0">
+        <a:scrgbClr r="0" g="0" b="0"/>
+      </a:effectRef>
+      <a:fontRef idx="minor"/>
+    </dgm:style>
+  </dgm:styleLbl>
+</dgm:styleDef>
+</file>
+
+<file path=ppt/diagrams/quickStyle2.xml><?xml version="1.0" encoding="utf-8"?>
+<dgm:styleDef xmlns:dgm="http://schemas.openxmlformats.org/drawingml/2006/diagram" xmlns:a="http://schemas.openxmlformats.org/drawingml/2006/main" uniqueId="urn:microsoft.com/office/officeart/2005/8/quickstyle/simple3">
+  <dgm:title val=""/>
+  <dgm:desc val=""/>
+  <dgm:catLst>
+    <dgm:cat type="simple" pri="10300"/>
+  </dgm:catLst>
+  <dgm:scene3d>
+    <a:camera prst="orthographicFront"/>
+    <a:lightRig rig="threePt" dir="t"/>
+  </dgm:scene3d>
+  <dgm:styleLbl name="node0">
+    <dgm:scene3d>
+      <a:camera prst="orthographicFront"/>
+      <a:lightRig rig="flat" dir="t"/>
+    </dgm:scene3d>
+    <dgm:sp3d prstMaterial="dkEdge">
+      <a:bevelT w="8200" h="38100"/>
+    </dgm:sp3d>
+    <dgm:txPr/>
+    <dgm:style>
+      <a:lnRef idx="0">
+        <a:scrgbClr r="0" g="0" b="0"/>
+      </a:lnRef>
+      <a:fillRef idx="2">
+        <a:scrgbClr r="0" g="0" b="0"/>
+      </a:fillRef>
+      <a:effectRef idx="1">
+        <a:scrgbClr r="0" g="0" b="0"/>
+      </a:effectRef>
+      <a:fontRef idx="minor">
+        <a:schemeClr val="dk1"/>
+      </a:fontRef>
+    </dgm:style>
+  </dgm:styleLbl>
+  <dgm:styleLbl name="lnNode1">
+    <dgm:scene3d>
+      <a:camera prst="orthographicFront"/>
+      <a:lightRig rig="flat" dir="t"/>
+    </dgm:scene3d>
+    <dgm:sp3d prstMaterial="dkEdge">
+      <a:bevelT w="8200" h="38100"/>
+    </dgm:sp3d>
+    <dgm:txPr/>
+    <dgm:style>
+      <a:lnRef idx="1">
+        <a:scrgbClr r="0" g="0" b="0"/>
+      </a:lnRef>
+      <a:fillRef idx="2">
+        <a:scrgbClr r="0" g="0" b="0"/>
+      </a:fillRef>
+      <a:effectRef idx="0">
+        <a:scrgbClr r="0" g="0" b="0"/>
+      </a:effectRef>
+      <a:fontRef idx="minor">
+        <a:schemeClr val="dk1"/>
+      </a:fontRef>
+    </dgm:style>
+  </dgm:styleLbl>
+  <dgm:styleLbl name="vennNode1">
+    <dgm:scene3d>
+      <a:camera prst="orthographicFront"/>
+      <a:lightRig rig="flat" dir="t"/>
+    </dgm:scene3d>
+    <dgm:sp3d prstMaterial="dkEdge">
+      <a:bevelT w="8200" h="38100"/>
+    </dgm:sp3d>
+    <dgm:txPr/>
+    <dgm:style>
+      <a:lnRef idx="0">
+        <a:scrgbClr r="0" g="0" b="0"/>
+      </a:lnRef>
+      <a:fillRef idx="2">
+        <a:scrgbClr r="0" g="0" b="0"/>
+      </a:fillRef>
+      <a:effectRef idx="0">
+        <a:scrgbClr r="0" g="0" b="0"/>
+      </a:effectRef>
+      <a:fontRef idx="minor">
+        <a:schemeClr val="tx1"/>
+      </a:fontRef>
+    </dgm:style>
+  </dgm:styleLbl>
+  <dgm:styleLbl name="alignNode1">
+    <dgm:scene3d>
+      <a:camera prst="orthographicFront"/>
+      <a:lightRig rig="threePt" dir="t"/>
+    </dgm:scene3d>
+    <dgm:sp3d/>
+    <dgm:txPr/>
+    <dgm:style>
+      <a:lnRef idx="1">
+        <a:scrgbClr r="0" g="0" b="0"/>
+      </a:lnRef>
+      <a:fillRef idx="2">
+        <a:scrgbClr r="0" g="0" b="0"/>
+      </a:fillRef>
+      <a:effectRef idx="1">
+        <a:scrgbClr r="0" g="0" b="0"/>
+      </a:effectRef>
+      <a:fontRef idx="minor">
+        <a:schemeClr val="dk1"/>
+      </a:fontRef>
+    </dgm:style>
+  </dgm:styleLbl>
+  <dgm:styleLbl name="node1">
+    <dgm:scene3d>
+      <a:camera prst="orthographicFront"/>
+      <a:lightRig rig="flat" dir="t"/>
+    </dgm:scene3d>
+    <dgm:sp3d prstMaterial="dkEdge">
+      <a:bevelT w="8200" h="38100"/>
+    </dgm:sp3d>
+    <dgm:txPr/>
+    <dgm:style>
+      <a:lnRef idx="0">
+        <a:scrgbClr r="0" g="0" b="0"/>
+      </a:lnRef>
+      <a:fillRef idx="2">
+        <a:scrgbClr r="0" g="0" b="0"/>
+      </a:fillRef>
+      <a:effectRef idx="1">
+        <a:scrgbClr r="0" g="0" b="0"/>
+      </a:effectRef>
+      <a:fontRef idx="minor">
+        <a:schemeClr val="dk1"/>
+      </a:fontRef>
+    </dgm:style>
+  </dgm:styleLbl>
+  <dgm:styleLbl name="node2">
+    <dgm:scene3d>
+      <a:camera prst="orthographicFront"/>
+      <a:lightRig rig="flat" dir="t"/>
+    </dgm:scene3d>
+    <dgm:sp3d prstMaterial="dkEdge">
+      <a:bevelT w="8200" h="38100"/>
+    </dgm:sp3d>
+    <dgm:txPr/>
+    <dgm:style>
+      <a:lnRef idx="0">
+        <a:scrgbClr r="0" g="0" b="0"/>
+      </a:lnRef>
+      <a:fillRef idx="2">
+        <a:scrgbClr r="0" g="0" b="0"/>
+      </a:fillRef>
+      <a:effectRef idx="1">
+        <a:scrgbClr r="0" g="0" b="0"/>
+      </a:effectRef>
+      <a:fontRef idx="minor">
+        <a:schemeClr val="dk1"/>
+      </a:fontRef>
+    </dgm:style>
+  </dgm:styleLbl>
+  <dgm:styleLbl name="node3">
+    <dgm:scene3d>
+      <a:camera prst="orthographicFront"/>
+      <a:lightRig rig="flat" dir="t"/>
+    </dgm:scene3d>
+    <dgm:sp3d prstMaterial="dkEdge">
+      <a:bevelT w="8200" h="38100"/>
+    </dgm:sp3d>
+    <dgm:txPr/>
+    <dgm:style>
+      <a:lnRef idx="0">
+        <a:scrgbClr r="0" g="0" b="0"/>
+      </a:lnRef>
+      <a:fillRef idx="2">
+        <a:scrgbClr r="0" g="0" b="0"/>
+      </a:fillRef>
+      <a:effectRef idx="1">
+        <a:scrgbClr r="0" g="0" b="0"/>
+      </a:effectRef>
+      <a:fontRef idx="minor">
+        <a:schemeClr val="dk1"/>
+      </a:fontRef>
+    </dgm:style>
+  </dgm:styleLbl>
+  <dgm:styleLbl name="node4">
+    <dgm:scene3d>
+      <a:camera prst="orthographicFront"/>
+      <a:lightRig rig="flat" dir="t"/>
+    </dgm:scene3d>
+    <dgm:sp3d prstMaterial="dkEdge">
+      <a:bevelT w="8200" h="38100"/>
+    </dgm:sp3d>
+    <dgm:txPr/>
+    <dgm:style>
+      <a:lnRef idx="0">
+        <a:scrgbClr r="0" g="0" b="0"/>
+      </a:lnRef>
+      <a:fillRef idx="2">
+        <a:scrgbClr r="0" g="0" b="0"/>
+      </a:fillRef>
+      <a:effectRef idx="1">
+        <a:scrgbClr r="0" g="0" b="0"/>
+      </a:effectRef>
+      <a:fontRef idx="minor">
+        <a:schemeClr val="dk1"/>
+      </a:fontRef>
+    </dgm:style>
+  </dgm:styleLbl>
+  <dgm:styleLbl name="fgImgPlace1">
+    <dgm:scene3d>
+      <a:camera prst="orthographicFront"/>
+      <a:lightRig rig="threePt" dir="t"/>
+    </dgm:scene3d>
+    <dgm:sp3d/>
+    <dgm:txPr/>
+    <dgm:style>
+      <a:lnRef idx="1">
+        <a:scrgbClr r="0" g="0" b="0"/>
+      </a:lnRef>
+      <a:fillRef idx="1">
+        <a:scrgbClr r="0" g="0" b="0"/>
+      </a:fillRef>
+      <a:effectRef idx="1">
+        <a:scrgbClr r="0" g="0" b="0"/>
+      </a:effectRef>
+      <a:fontRef idx="minor"/>
+    </dgm:style>
+  </dgm:styleLbl>
+  <dgm:styleLbl name="alignImgPlace1">
+    <dgm:scene3d>
+      <a:camera prst="orthographicFront"/>
+      <a:lightRig rig="threePt" dir="t"/>
+    </dgm:scene3d>
+    <dgm:sp3d/>
+    <dgm:txPr/>
+    <dgm:style>
+      <a:lnRef idx="1">
+        <a:scrgbClr r="0" g="0" b="0"/>
+      </a:lnRef>
+      <a:fillRef idx="1">
+        <a:scrgbClr r="0" g="0" b="0"/>
+      </a:fillRef>
+      <a:effectRef idx="1">
+        <a:scrgbClr r="0" g="0" b="0"/>
+      </a:effectRef>
+      <a:fontRef idx="minor"/>
+    </dgm:style>
+  </dgm:styleLbl>
+  <dgm:styleLbl name="bgImgPlace1">
+    <dgm:scene3d>
+      <a:camera prst="orthographicFront"/>
+      <a:lightRig rig="threePt" dir="t"/>
+    </dgm:scene3d>
+    <dgm:sp3d/>
+    <dgm:txPr/>
+    <dgm:style>
+      <a:lnRef idx="1">
+        <a:scrgbClr r="0" g="0" b="0"/>
+      </a:lnRef>
+      <a:fillRef idx="1">
+        <a:scrgbClr r="0" g="0" b="0"/>
+      </a:fillRef>
+      <a:effectRef idx="1">
+        <a:scrgbClr r="0" g="0" b="0"/>
+      </a:effectRef>
+      <a:fontRef idx="minor"/>
+    </dgm:style>
+  </dgm:styleLbl>
+  <dgm:styleLbl name="sibTrans2D1">
+    <dgm:scene3d>
+      <a:camera prst="orthographicFront"/>
+      <a:lightRig rig="threePt" dir="t"/>
+    </dgm:scene3d>
+    <dgm:sp3d/>
+    <dgm:txPr/>
+    <dgm:style>
+      <a:lnRef idx="0">
+        <a:scrgbClr r="0" g="0" b="0"/>
+      </a:lnRef>
+      <a:fillRef idx="2">
+        <a:scrgbClr r="0" g="0" b="0"/>
+      </a:fillRef>
+      <a:effectRef idx="1">
+        <a:scrgbClr r="0" g="0" b="0"/>
+      </a:effectRef>
+      <a:fontRef idx="minor">
+        <a:schemeClr val="dk1"/>
+      </a:fontRef>
+    </dgm:style>
+  </dgm:styleLbl>
+  <dgm:styleLbl name="fgSibTrans2D1">
+    <dgm:scene3d>
+      <a:camera prst="orthographicFront"/>
+      <a:lightRig rig="threePt" dir="t"/>
+    </dgm:scene3d>
+    <dgm:sp3d/>
+    <dgm:txPr/>
+    <dgm:style>
+      <a:lnRef idx="0">
+        <a:scrgbClr r="0" g="0" b="0"/>
+      </a:lnRef>
+      <a:fillRef idx="2">
+        <a:scrgbClr r="0" g="0" b="0"/>
+      </a:fillRef>
+      <a:effectRef idx="1">
+        <a:scrgbClr r="0" g="0" b="0"/>
+      </a:effectRef>
+      <a:fontRef idx="minor">
+        <a:schemeClr val="dk1"/>
+      </a:fontRef>
+    </dgm:style>
+  </dgm:styleLbl>
+  <dgm:styleLbl name="bgSibTrans2D1">
+    <dgm:scene3d>
+      <a:camera prst="orthographicFront"/>
+      <a:lightRig rig="threePt" dir="t"/>
+    </dgm:scene3d>
+    <dgm:sp3d/>
+    <dgm:txPr/>
+    <dgm:style>
+      <a:lnRef idx="0">
+        <a:scrgbClr r="0" g="0" b="0"/>
+      </a:lnRef>
+      <a:fillRef idx="2">
+        <a:scrgbClr r="0" g="0" b="0"/>
+      </a:fillRef>
+      <a:effectRef idx="1">
+        <a:scrgbClr r="0" g="0" b="0"/>
+      </a:effectRef>
+      <a:fontRef idx="minor">
+        <a:schemeClr val="dk1"/>
+      </a:fontRef>
+    </dgm:style>
+  </dgm:styleLbl>
+  <dgm:styleLbl name="sibTrans1D1">
+    <dgm:scene3d>
+      <a:camera prst="orthographicFront"/>
+      <a:lightRig rig="threePt" dir="t"/>
+    </dgm:scene3d>
+    <dgm:sp3d/>
+    <dgm:txPr/>
+    <dgm:style>
+      <a:lnRef idx="1">
+        <a:scrgbClr r="0" g="0" b="0"/>
+      </a:lnRef>
+      <a:fillRef idx="0">
+        <a:scrgbClr r="0" g="0" b="0"/>
+      </a:fillRef>
+      <a:effectRef idx="0">
+        <a:scrgbClr r="0" g="0" b="0"/>
+      </a:effectRef>
+      <a:fontRef idx="minor"/>
+    </dgm:style>
+  </dgm:styleLbl>
+  <dgm:styleLbl name="callout">
+    <dgm:scene3d>
+      <a:camera prst="orthographicFront"/>
+      <a:lightRig rig="threePt" dir="t"/>
+    </dgm:scene3d>
+    <dgm:sp3d/>
+    <dgm:txPr/>
+    <dgm:style>
+      <a:lnRef idx="1">
+        <a:scrgbClr r="0" g="0" b="0"/>
+      </a:lnRef>
+      <a:fillRef idx="2">
+        <a:scrgbClr r="0" g="0" b="0"/>
+      </a:fillRef>
+      <a:effectRef idx="1">
+        <a:scrgbClr r="0" g="0" b="0"/>
+      </a:effectRef>
+      <a:fontRef idx="minor"/>
+    </dgm:style>
+  </dgm:styleLbl>
+  <dgm:styleLbl name="asst0">
+    <dgm:scene3d>
+      <a:camera prst="orthographicFront"/>
+      <a:lightRig rig="flat" dir="t"/>
+    </dgm:scene3d>
+    <dgm:sp3d prstMaterial="dkEdge">
+      <a:bevelT w="8200" h="38100"/>
+    </dgm:sp3d>
+    <dgm:txPr/>
+    <dgm:style>
+      <a:lnRef idx="0">
+        <a:scrgbClr r="0" g="0" b="0"/>
+      </a:lnRef>
+      <a:fillRef idx="2">
+        <a:scrgbClr r="0" g="0" b="0"/>
+      </a:fillRef>
+      <a:effectRef idx="1">
+        <a:scrgbClr r="0" g="0" b="0"/>
+      </a:effectRef>
+      <a:fontRef idx="minor">
+        <a:schemeClr val="dk1"/>
+      </a:fontRef>
+    </dgm:style>
+  </dgm:styleLbl>
+  <dgm:styleLbl name="asst1">
+    <dgm:scene3d>
+      <a:camera prst="orthographicFront"/>
+      <a:lightRig rig="flat" dir="t"/>
+    </dgm:scene3d>
+    <dgm:sp3d prstMaterial="dkEdge">
+      <a:bevelT w="8200" h="38100"/>
+    </dgm:sp3d>
+    <dgm:txPr/>
+    <dgm:style>
+      <a:lnRef idx="0">
+        <a:scrgbClr r="0" g="0" b="0"/>
+      </a:lnRef>
+      <a:fillRef idx="2">
+        <a:scrgbClr r="0" g="0" b="0"/>
+      </a:fillRef>
+      <a:effectRef idx="1">
+        <a:scrgbClr r="0" g="0" b="0"/>
+      </a:effectRef>
+      <a:fontRef idx="minor">
+        <a:schemeClr val="dk1"/>
+      </a:fontRef>
+    </dgm:style>
+  </dgm:styleLbl>
+  <dgm:styleLbl name="asst2">
+    <dgm:scene3d>
+      <a:camera prst="orthographicFront"/>
+      <a:lightRig rig="flat" dir="t"/>
+    </dgm:scene3d>
+    <dgm:sp3d prstMaterial="dkEdge">
+      <a:bevelT w="8200" h="38100"/>
+    </dgm:sp3d>
+    <dgm:txPr/>
+    <dgm:style>
+      <a:lnRef idx="0">
+        <a:scrgbClr r="0" g="0" b="0"/>
+      </a:lnRef>
+      <a:fillRef idx="2">
+        <a:scrgbClr r="0" g="0" b="0"/>
+      </a:fillRef>
+      <a:effectRef idx="1">
+        <a:scrgbClr r="0" g="0" b="0"/>
+      </a:effectRef>
+      <a:fontRef idx="minor">
+        <a:schemeClr val="dk1"/>
+      </a:fontRef>
+    </dgm:style>
+  </dgm:styleLbl>
+  <dgm:styleLbl name="asst3">
+    <dgm:scene3d>
+      <a:camera prst="orthographicFront"/>
+      <a:lightRig rig="flat" dir="t"/>
+    </dgm:scene3d>
+    <dgm:sp3d prstMaterial="dkEdge">
+      <a:bevelT w="8200" h="38100"/>
+    </dgm:sp3d>
+    <dgm:txPr/>
+    <dgm:style>
+      <a:lnRef idx="0">
+        <a:scrgbClr r="0" g="0" b="0"/>
+      </a:lnRef>
+      <a:fillRef idx="2">
+        <a:scrgbClr r="0" g="0" b="0"/>
+      </a:fillRef>
+      <a:effectRef idx="1">
+        <a:scrgbClr r="0" g="0" b="0"/>
+      </a:effectRef>
+      <a:fontRef idx="minor">
+        <a:schemeClr val="dk1"/>
+      </a:fontRef>
+    </dgm:style>
+  </dgm:styleLbl>
+  <dgm:styleLbl name="asst4">
+    <dgm:scene3d>
+      <a:camera prst="orthographicFront"/>
+      <a:lightRig rig="flat" dir="t"/>
+    </dgm:scene3d>
+    <dgm:sp3d prstMaterial="dkEdge">
+      <a:bevelT w="8200" h="38100"/>
+    </dgm:sp3d>
+    <dgm:txPr/>
+    <dgm:style>
+      <a:lnRef idx="0">
+        <a:scrgbClr r="0" g="0" b="0"/>
+      </a:lnRef>
+      <a:fillRef idx="2">
+        <a:scrgbClr r="0" g="0" b="0"/>
+      </a:fillRef>
+      <a:effectRef idx="1">
+        <a:scrgbClr r="0" g="0" b="0"/>
+      </a:effectRef>
+      <a:fontRef idx="minor">
+        <a:schemeClr val="dk1"/>
+      </a:fontRef>
+    </dgm:style>
+  </dgm:styleLbl>
+  <dgm:styleLbl name="parChTrans2D1">
+    <dgm:scene3d>
+      <a:camera prst="orthographicFront"/>
+      <a:lightRig rig="threePt" dir="t"/>
+    </dgm:scene3d>
+    <dgm:sp3d/>
+    <dgm:txPr/>
+    <dgm:style>
+      <a:lnRef idx="1">
+        <a:scrgbClr r="0" g="0" b="0"/>
+      </a:lnRef>
+      <a:fillRef idx="2">
+        <a:scrgbClr r="0" g="0" b="0"/>
+      </a:fillRef>
+      <a:effectRef idx="1">
+        <a:scrgbClr r="0" g="0" b="0"/>
+      </a:effectRef>
+      <a:fontRef idx="minor">
+        <a:schemeClr val="dk1"/>
+      </a:fontRef>
+    </dgm:style>
+  </dgm:styleLbl>
+  <dgm:styleLbl name="parChTrans2D2">
+    <dgm:scene3d>
+      <a:camera prst="orthographicFront"/>
+      <a:lightRig rig="threePt" dir="t"/>
+    </dgm:scene3d>
+    <dgm:sp3d/>
+    <dgm:txPr/>
+    <dgm:style>
+      <a:lnRef idx="1">
+        <a:scrgbClr r="0" g="0" b="0"/>
+      </a:lnRef>
+      <a:fillRef idx="2">
+        <a:scrgbClr r="0" g="0" b="0"/>
+      </a:fillRef>
+      <a:effectRef idx="1">
+        <a:scrgbClr r="0" g="0" b="0"/>
+      </a:effectRef>
+      <a:fontRef idx="minor">
+        <a:schemeClr val="dk1"/>
+      </a:fontRef>
+    </dgm:style>
+  </dgm:styleLbl>
+  <dgm:styleLbl name="parChTrans2D3">
+    <dgm:scene3d>
+      <a:camera prst="orthographicFront"/>
+      <a:lightRig rig="threePt" dir="t"/>
+    </dgm:scene3d>
+    <dgm:sp3d/>
+    <dgm:txPr/>
+    <dgm:style>
+      <a:lnRef idx="1">
+        <a:scrgbClr r="0" g="0" b="0"/>
+      </a:lnRef>
+      <a:fillRef idx="2">
+        <a:scrgbClr r="0" g="0" b="0"/>
+      </a:fillRef>
+      <a:effectRef idx="1">
+        <a:scrgbClr r="0" g="0" b="0"/>
+      </a:effectRef>
+      <a:fontRef idx="minor">
+        <a:schemeClr val="dk1"/>
+      </a:fontRef>
+    </dgm:style>
+  </dgm:styleLbl>
+  <dgm:styleLbl name="parChTrans2D4">
+    <dgm:scene3d>
+      <a:camera prst="orthographicFront"/>
+      <a:lightRig rig="threePt" dir="t"/>
+    </dgm:scene3d>
+    <dgm:sp3d/>
+    <dgm:txPr/>
+    <dgm:style>
+      <a:lnRef idx="1">
+        <a:scrgbClr r="0" g="0" b="0"/>
+      </a:lnRef>
+      <a:fillRef idx="2">
+        <a:scrgbClr r="0" g="0" b="0"/>
+      </a:fillRef>
+      <a:effectRef idx="1">
+        <a:scrgbClr r="0" g="0" b="0"/>
+      </a:effectRef>
+      <a:fontRef idx="minor">
+        <a:schemeClr val="dk1"/>
+      </a:fontRef>
+    </dgm:style>
+  </dgm:styleLbl>
+  <dgm:styleLbl name="parChTrans1D1">
+    <dgm:scene3d>
+      <a:camera prst="orthographicFront"/>
+      <a:lightRig rig="threePt" dir="t"/>
+    </dgm:scene3d>
+    <dgm:sp3d/>
+    <dgm:txPr/>
+    <dgm:style>
+      <a:lnRef idx="2">
+        <a:scrgbClr r="0" g="0" b="0"/>
+      </a:lnRef>
+      <a:fillRef idx="0">
+        <a:scrgbClr r="0" g="0" b="0"/>
+      </a:fillRef>
+      <a:effectRef idx="0">
+        <a:scrgbClr r="0" g="0" b="0"/>
+      </a:effectRef>
+      <a:fontRef idx="minor"/>
+    </dgm:style>
+  </dgm:styleLbl>
+  <dgm:styleLbl name="parChTrans1D2">
+    <dgm:scene3d>
+      <a:camera prst="orthographicFront"/>
+      <a:lightRig rig="threePt" dir="t"/>
+    </dgm:scene3d>
+    <dgm:sp3d/>
+    <dgm:txPr/>
+    <dgm:style>
+      <a:lnRef idx="2">
+        <a:scrgbClr r="0" g="0" b="0"/>
+      </a:lnRef>
+      <a:fillRef idx="0">
+        <a:scrgbClr r="0" g="0" b="0"/>
+      </a:fillRef>
+      <a:effectRef idx="0">
+        <a:scrgbClr r="0" g="0" b="0"/>
+      </a:effectRef>
+      <a:fontRef idx="minor"/>
+    </dgm:style>
+  </dgm:styleLbl>
+  <dgm:styleLbl name="parChTrans1D3">
+    <dgm:scene3d>
+      <a:camera prst="orthographicFront"/>
+      <a:lightRig rig="threePt" dir="t"/>
+    </dgm:scene3d>
+    <dgm:sp3d/>
+    <dgm:txPr/>
+    <dgm:style>
+      <a:lnRef idx="2">
+        <a:scrgbClr r="0" g="0" b="0"/>
+      </a:lnRef>
+      <a:fillRef idx="0">
+        <a:scrgbClr r="0" g="0" b="0"/>
+      </a:fillRef>
+      <a:effectRef idx="0">
+        <a:scrgbClr r="0" g="0" b="0"/>
+      </a:effectRef>
+      <a:fontRef idx="minor"/>
+    </dgm:style>
+  </dgm:styleLbl>
+  <dgm:styleLbl name="parChTrans1D4">
+    <dgm:scene3d>
+      <a:camera prst="orthographicFront"/>
+      <a:lightRig rig="threePt" dir="t"/>
+    </dgm:scene3d>
+    <dgm:sp3d/>
+    <dgm:txPr/>
+    <dgm:style>
+      <a:lnRef idx="2">
+        <a:scrgbClr r="0" g="0" b="0"/>
+      </a:lnRef>
+      <a:fillRef idx="0">
+        <a:scrgbClr r="0" g="0" b="0"/>
+      </a:fillRef>
+      <a:effectRef idx="0">
+        <a:scrgbClr r="0" g="0" b="0"/>
+      </a:effectRef>
+      <a:fontRef idx="minor"/>
+    </dgm:style>
+  </dgm:styleLbl>
+  <dgm:styleLbl name="fgAcc1">
+    <dgm:scene3d>
+      <a:camera prst="orthographicFront"/>
+      <a:lightRig rig="threePt" dir="t"/>
+    </dgm:scene3d>
+    <dgm:sp3d/>
+    <dgm:txPr/>
+    <dgm:style>
+      <a:lnRef idx="1">
+        <a:scrgbClr r="0" g="0" b="0"/>
+      </a:lnRef>
+      <a:fillRef idx="1">
+        <a:scrgbClr r="0" g="0" b="0"/>
+      </a:fillRef>
+      <a:effectRef idx="0">
+        <a:scrgbClr r="0" g="0" b="0"/>
+      </a:effectRef>
+      <a:fontRef idx="minor"/>
+    </dgm:style>
+  </dgm:styleLbl>
+  <dgm:styleLbl name="conFgAcc1">
+    <dgm:scene3d>
+      <a:camera prst="orthographicFront"/>
+      <a:lightRig rig="threePt" dir="t"/>
+    </dgm:scene3d>
+    <dgm:sp3d/>
+    <dgm:txPr/>
+    <dgm:style>
+      <a:lnRef idx="1">
+        <a:scrgbClr r="0" g="0" b="0"/>
+      </a:lnRef>
+      <a:fillRef idx="1">
+        <a:scrgbClr r="0" g="0" b="0"/>
+      </a:fillRef>
+      <a:effectRef idx="0">
+        <a:scrgbClr r="0" g="0" b="0"/>
+      </a:effectRef>
+      <a:fontRef idx="minor"/>
+    </dgm:style>
+  </dgm:styleLbl>
+  <dgm:styleLbl name="alignAcc1">
+    <dgm:scene3d>
+      <a:camera prst="orthographicFront"/>
+      <a:lightRig rig="threePt" dir="t"/>
+    </dgm:scene3d>
+    <dgm:sp3d/>
+    <dgm:txPr/>
+    <dgm:style>
+      <a:lnRef idx="1">
+        <a:scrgbClr r="0" g="0" b="0"/>
+      </a:lnRef>
+      <a:fillRef idx="1">
+        <a:scrgbClr r="0" g="0" b="0"/>
+      </a:fillRef>
+      <a:effectRef idx="0">
+        <a:scrgbClr r="0" g="0" b="0"/>
+      </a:effectRef>
+      <a:fontRef idx="minor"/>
+    </dgm:style>
+  </dgm:styleLbl>
+  <dgm:styleLbl name="trAlignAcc1">
+    <dgm:scene3d>
+      <a:camera prst="orthographicFront"/>
+      <a:lightRig rig="threePt" dir="t"/>
+    </dgm:scene3d>
+    <dgm:sp3d/>
+    <dgm:txPr/>
+    <dgm:style>
+      <a:lnRef idx="1">
+        <a:scrgbClr r="0" g="0" b="0"/>
+      </a:lnRef>
+      <a:fillRef idx="1">
+        <a:scrgbClr r="0" g="0" b="0"/>
+      </a:fillRef>
+      <a:effectRef idx="0">
+        <a:scrgbClr r="0" g="0" b="0"/>
+      </a:effectRef>
+      <a:fontRef idx="minor"/>
+    </dgm:style>
+  </dgm:styleLbl>
+  <dgm:styleLbl name="bgAcc1">
+    <dgm:scene3d>
+      <a:camera prst="orthographicFront"/>
+      <a:lightRig rig="threePt" dir="t"/>
+    </dgm:scene3d>
+    <dgm:sp3d/>
+    <dgm:txPr/>
+    <dgm:style>
+      <a:lnRef idx="1">
+        <a:scrgbClr r="0" g="0" b="0"/>
+      </a:lnRef>
+      <a:fillRef idx="1">
+        <a:scrgbClr r="0" g="0" b="0"/>
+      </a:fillRef>
+      <a:effectRef idx="0">
+        <a:scrgbClr r="0" g="0" b="0"/>
+      </a:effectRef>
+      <a:fontRef idx="minor"/>
+    </dgm:style>
+  </dgm:styleLbl>
+  <dgm:styleLbl name="solidFgAcc1">
+    <dgm:scene3d>
+      <a:camera prst="orthographicFront"/>
+      <a:lightRig rig="threePt" dir="t"/>
+    </dgm:scene3d>
+    <dgm:sp3d/>
+    <dgm:txPr/>
+    <dgm:style>
+      <a:lnRef idx="1">
+        <a:scrgbClr r="0" g="0" b="0"/>
+      </a:lnRef>
+      <a:fillRef idx="2">
+        <a:scrgbClr r="0" g="0" b="0"/>
+      </a:fillRef>
+      <a:effectRef idx="0">
+        <a:scrgbClr r="0" g="0" b="0"/>
+      </a:effectRef>
+      <a:fontRef idx="minor"/>
+    </dgm:style>
+  </dgm:styleLbl>
+  <dgm:styleLbl name="solidAlignAcc1">
+    <dgm:scene3d>
+      <a:camera prst="orthographicFront"/>
+      <a:lightRig rig="threePt" dir="t"/>
+    </dgm:scene3d>
+    <dgm:sp3d/>
+    <dgm:txPr/>
+    <dgm:style>
+      <a:lnRef idx="1">
+        <a:scrgbClr r="0" g="0" b="0"/>
+      </a:lnRef>
+      <a:fillRef idx="1">
+        <a:scrgbClr r="0" g="0" b="0"/>
+      </a:fillRef>
+      <a:effectRef idx="0">
+        <a:scrgbClr r="0" g="0" b="0"/>
+      </a:effectRef>
+      <a:fontRef idx="minor"/>
+    </dgm:style>
+  </dgm:styleLbl>
+  <dgm:styleLbl name="solidBgAcc1">
+    <dgm:scene3d>
+      <a:camera prst="orthographicFront"/>
+      <a:lightRig rig="threePt" dir="t"/>
+    </dgm:scene3d>
+    <dgm:sp3d/>
+    <dgm:txPr/>
+    <dgm:style>
+      <a:lnRef idx="1">
+        <a:scrgbClr r="0" g="0" b="0"/>
+      </a:lnRef>
+      <a:fillRef idx="1">
+        <a:scrgbClr r="0" g="0" b="0"/>
+      </a:fillRef>
+      <a:effectRef idx="0">
+        <a:scrgbClr r="0" g="0" b="0"/>
+      </a:effectRef>
+      <a:fontRef idx="minor"/>
+    </dgm:style>
+  </dgm:styleLbl>
+  <dgm:styleLbl name="fgAccFollowNode1">
+    <dgm:scene3d>
+      <a:camera prst="orthographicFront"/>
+      <a:lightRig rig="threePt" dir="t"/>
+    </dgm:scene3d>
+    <dgm:sp3d/>
+    <dgm:txPr/>
+    <dgm:style>
+      <a:lnRef idx="1">
+        <a:scrgbClr r="0" g="0" b="0"/>
+      </a:lnRef>
+      <a:fillRef idx="1">
+        <a:scrgbClr r="0" g="0" b="0"/>
+      </a:fillRef>
+      <a:effectRef idx="0">
+        <a:scrgbClr r="0" g="0" b="0"/>
+      </a:effectRef>
+      <a:fontRef idx="minor"/>
+    </dgm:style>
+  </dgm:styleLbl>
+  <dgm:styleLbl name="alignAccFollowNode1">
+    <dgm:scene3d>
+      <a:camera prst="orthographicFront"/>
+      <a:lightRig rig="threePt" dir="t"/>
+    </dgm:scene3d>
+    <dgm:sp3d/>
+    <dgm:txPr/>
+    <dgm:style>
+      <a:lnRef idx="1">
+        <a:scrgbClr r="0" g="0" b="0"/>
+      </a:lnRef>
+      <a:fillRef idx="1">
+        <a:scrgbClr r="0" g="0" b="0"/>
+      </a:fillRef>
+      <a:effectRef idx="0">
+        <a:scrgbClr r="0" g="0" b="0"/>
+      </a:effectRef>
+      <a:fontRef idx="minor"/>
+    </dgm:style>
+  </dgm:styleLbl>
+  <dgm:styleLbl name="bgAccFollowNode1">
+    <dgm:scene3d>
+      <a:camera prst="orthographicFront"/>
+      <a:lightRig rig="threePt" dir="t"/>
+    </dgm:scene3d>
+    <dgm:sp3d/>
+    <dgm:txPr/>
+    <dgm:style>
+      <a:lnRef idx="1">
+        <a:scrgbClr r="0" g="0" b="0"/>
+      </a:lnRef>
+      <a:fillRef idx="1">
+        <a:scrgbClr r="0" g="0" b="0"/>
+      </a:fillRef>
+      <a:effectRef idx="0">
+        <a:scrgbClr r="0" g="0" b="0"/>
+      </a:effectRef>
+      <a:fontRef idx="minor"/>
+    </dgm:style>
+  </dgm:styleLbl>
+  <dgm:styleLbl name="fgAcc0">
+    <dgm:scene3d>
+      <a:camera prst="orthographicFront"/>
+      <a:lightRig rig="threePt" dir="t"/>
+    </dgm:scene3d>
+    <dgm:sp3d/>
+    <dgm:txPr/>
+    <dgm:style>
+      <a:lnRef idx="1">
+        <a:scrgbClr r="0" g="0" b="0"/>
+      </a:lnRef>
+      <a:fillRef idx="1">
+        <a:scrgbClr r="0" g="0" b="0"/>
+      </a:fillRef>
+      <a:effectRef idx="0">
+        <a:scrgbClr r="0" g="0" b="0"/>
+      </a:effectRef>
+      <a:fontRef idx="minor"/>
+    </dgm:style>
+  </dgm:styleLbl>
+  <dgm:styleLbl name="fgAcc2">
+    <dgm:scene3d>
+      <a:camera prst="orthographicFront"/>
+      <a:lightRig rig="threePt" dir="t"/>
+    </dgm:scene3d>
+    <dgm:sp3d/>
+    <dgm:txPr/>
+    <dgm:style>
+      <a:lnRef idx="1">
+        <a:scrgbClr r="0" g="0" b="0"/>
+      </a:lnRef>
+      <a:fillRef idx="1">
+        <a:scrgbClr r="0" g="0" b="0"/>
+      </a:fillRef>
+      <a:effectRef idx="0">
+        <a:scrgbClr r="0" g="0" b="0"/>
+      </a:effectRef>
+      <a:fontRef idx="minor"/>
+    </dgm:style>
+  </dgm:styleLbl>
+  <dgm:styleLbl name="fgAcc3">
+    <dgm:scene3d>
+      <a:camera prst="orthographicFront"/>
+      <a:lightRig rig="threePt" dir="t"/>
+    </dgm:scene3d>
+    <dgm:sp3d/>
+    <dgm:txPr/>
+    <dgm:style>
+      <a:lnRef idx="1">
+        <a:scrgbClr r="0" g="0" b="0"/>
+      </a:lnRef>
+      <a:fillRef idx="1">
+        <a:scrgbClr r="0" g="0" b="0"/>
+      </a:fillRef>
+      <a:effectRef idx="0">
+        <a:scrgbClr r="0" g="0" b="0"/>
+      </a:effectRef>
+      <a:fontRef idx="minor"/>
+    </dgm:style>
+  </dgm:styleLbl>
+  <dgm:styleLbl name="fgAcc4">
+    <dgm:scene3d>
+      <a:camera prst="orthographicFront"/>
+      <a:lightRig rig="threePt" dir="t"/>
+    </dgm:scene3d>
+    <dgm:sp3d/>
+    <dgm:txPr/>
+    <dgm:style>
+      <a:lnRef idx="1">
+        <a:scrgbClr r="0" g="0" b="0"/>
+      </a:lnRef>
+      <a:fillRef idx="1">
+        <a:scrgbClr r="0" g="0" b="0"/>
+      </a:fillRef>
+      <a:effectRef idx="0">
+        <a:scrgbClr r="0" g="0" b="0"/>
+      </a:effectRef>
+      <a:fontRef idx="minor"/>
+    </dgm:style>
+  </dgm:styleLbl>
+  <dgm:styleLbl name="bgShp">
+    <dgm:scene3d>
+      <a:camera prst="orthographicFront"/>
+      <a:lightRig rig="threePt" dir="t"/>
+    </dgm:scene3d>
+    <dgm:sp3d/>
+    <dgm:txPr/>
+    <dgm:style>
+      <a:lnRef idx="0">
+        <a:scrgbClr r="0" g="0" b="0"/>
+      </a:lnRef>
+      <a:fillRef idx="1">
+        <a:scrgbClr r="0" g="0" b="0"/>
+      </a:fillRef>
+      <a:effectRef idx="1">
+        <a:scrgbClr r="0" g="0" b="0"/>
+      </a:effectRef>
+      <a:fontRef idx="minor"/>
+    </dgm:style>
+  </dgm:styleLbl>
+  <dgm:styleLbl name="dkBgShp">
+    <dgm:scene3d>
+      <a:camera prst="orthographicFront"/>
+      <a:lightRig rig="threePt" dir="t"/>
+    </dgm:scene3d>
+    <dgm:sp3d/>
+    <dgm:txPr/>
+    <dgm:style>
+      <a:lnRef idx="0">
+        <a:scrgbClr r="0" g="0" b="0"/>
+      </a:lnRef>
+      <a:fillRef idx="1">
+        <a:scrgbClr r="0" g="0" b="0"/>
+      </a:fillRef>
+      <a:effectRef idx="1">
+        <a:scrgbClr r="0" g="0" b="0"/>
+      </a:effectRef>
+      <a:fontRef idx="minor"/>
+    </dgm:style>
+  </dgm:styleLbl>
+  <dgm:styleLbl name="trBgShp">
+    <dgm:scene3d>
+      <a:camera prst="orthographicFront"/>
+      <a:lightRig rig="threePt" dir="t"/>
+    </dgm:scene3d>
+    <dgm:sp3d/>
+    <dgm:txPr/>
+    <dgm:style>
+      <a:lnRef idx="0">
+        <a:scrgbClr r="0" g="0" b="0"/>
+      </a:lnRef>
+      <a:fillRef idx="1">
+        <a:scrgbClr r="0" g="0" b="0"/>
+      </a:fillRef>
+      <a:effectRef idx="0">
+        <a:scrgbClr r="0" g="0" b="0"/>
+      </a:effectRef>
+      <a:fontRef idx="minor"/>
+    </dgm:style>
+  </dgm:styleLbl>
+  <dgm:styleLbl name="fgShp">
+    <dgm:scene3d>
+      <a:camera prst="orthographicFront"/>
+      <a:lightRig rig="flat" dir="t"/>
+    </dgm:scene3d>
+    <dgm:sp3d prstMaterial="dkEdge">
+      <a:bevelT w="8200" h="38100"/>
+    </dgm:sp3d>
+    <dgm:txPr/>
+    <dgm:style>
+      <a:lnRef idx="1">
+        <a:scrgbClr r="0" g="0" b="0"/>
+      </a:lnRef>
+      <a:fillRef idx="2">
+        <a:scrgbClr r="0" g="0" b="0"/>
+      </a:fillRef>
+      <a:effectRef idx="1">
         <a:scrgbClr r="0" g="0" b="0"/>
       </a:effectRef>
       <a:fontRef idx="minor"/>
@@ -9673,6 +12536,191 @@
   <p:clrMapOvr>
     <a:masterClrMapping/>
   </p:clrMapOvr>
+  <p:timing>
+    <p:tnLst>
+      <p:par>
+        <p:cTn id="1" dur="indefinite" restart="never" nodeType="tmRoot"/>
+      </p:par>
+    </p:tnLst>
+  </p:timing>
+</p:sld>
+</file>
+
+<file path=ppt/slides/slide10.xml><?xml version="1.0" encoding="utf-8"?>
+<p:sld xmlns:a="http://schemas.openxmlformats.org/drawingml/2006/main" xmlns:r="http://schemas.openxmlformats.org/officeDocument/2006/relationships" xmlns:p="http://schemas.openxmlformats.org/presentationml/2006/main">
+  <p:cSld>
+    <p:spTree>
+      <p:nvGrpSpPr>
+        <p:cNvPr id="1" name=""/>
+        <p:cNvGrpSpPr/>
+        <p:nvPr/>
+      </p:nvGrpSpPr>
+      <p:grpSpPr>
+        <a:xfrm>
+          <a:off x="0" y="0"/>
+          <a:ext cx="0" cy="0"/>
+          <a:chOff x="0" y="0"/>
+          <a:chExt cx="0" cy="0"/>
+        </a:xfrm>
+      </p:grpSpPr>
+      <p:sp>
+        <p:nvSpPr>
+          <p:cNvPr id="2" name="Title 1"/>
+          <p:cNvSpPr>
+            <a:spLocks noGrp="1"/>
+          </p:cNvSpPr>
+          <p:nvPr>
+            <p:ph type="title"/>
+          </p:nvPr>
+        </p:nvSpPr>
+        <p:spPr/>
+        <p:txBody>
+          <a:bodyPr/>
+          <a:lstStyle/>
+          <a:p>
+            <a:r>
+              <a:rPr lang="en-US" dirty="0" smtClean="0"/>
+              <a:t>Q&amp;A</a:t>
+            </a:r>
+            <a:endParaRPr lang="en-US" dirty="0"/>
+          </a:p>
+        </p:txBody>
+      </p:sp>
+      <p:pic>
+        <p:nvPicPr>
+          <p:cNvPr id="4" name="Content Placeholder 3"/>
+          <p:cNvPicPr>
+            <a:picLocks noGrp="1" noChangeAspect="1"/>
+          </p:cNvPicPr>
+          <p:nvPr>
+            <p:ph idx="1"/>
+          </p:nvPr>
+        </p:nvPicPr>
+        <p:blipFill>
+          <a:blip r:embed="rId2">
+            <a:extLst>
+              <a:ext uri="{28A0092B-C50C-407E-A947-70E740481C1C}">
+                <a14:useLocalDpi xmlns:a14="http://schemas.microsoft.com/office/drawing/2010/main" val="0"/>
+              </a:ext>
+            </a:extLst>
+          </a:blip>
+          <a:stretch>
+            <a:fillRect/>
+          </a:stretch>
+        </p:blipFill>
+        <p:spPr>
+          <a:xfrm>
+            <a:off x="4543425" y="2286000"/>
+            <a:ext cx="3594100" cy="3594100"/>
+          </a:xfrm>
+        </p:spPr>
+      </p:pic>
+    </p:spTree>
+    <p:extLst>
+      <p:ext uri="{BB962C8B-B14F-4D97-AF65-F5344CB8AC3E}">
+        <p14:creationId xmlns:p14="http://schemas.microsoft.com/office/powerpoint/2010/main" val="2360511060"/>
+      </p:ext>
+    </p:extLst>
+  </p:cSld>
+  <p:clrMapOvr>
+    <a:masterClrMapping/>
+  </p:clrMapOvr>
+  <p:timing>
+    <p:tnLst>
+      <p:par>
+        <p:cTn id="1" dur="indefinite" restart="never" nodeType="tmRoot"/>
+      </p:par>
+    </p:tnLst>
+  </p:timing>
+</p:sld>
+</file>
+
+<file path=ppt/slides/slide11.xml><?xml version="1.0" encoding="utf-8"?>
+<p:sld xmlns:a="http://schemas.openxmlformats.org/drawingml/2006/main" xmlns:r="http://schemas.openxmlformats.org/officeDocument/2006/relationships" xmlns:p="http://schemas.openxmlformats.org/presentationml/2006/main">
+  <p:cSld>
+    <p:spTree>
+      <p:nvGrpSpPr>
+        <p:cNvPr id="1" name=""/>
+        <p:cNvGrpSpPr/>
+        <p:nvPr/>
+      </p:nvGrpSpPr>
+      <p:grpSpPr>
+        <a:xfrm>
+          <a:off x="0" y="0"/>
+          <a:ext cx="0" cy="0"/>
+          <a:chOff x="0" y="0"/>
+          <a:chExt cx="0" cy="0"/>
+        </a:xfrm>
+      </p:grpSpPr>
+      <p:sp>
+        <p:nvSpPr>
+          <p:cNvPr id="2" name="Title 1"/>
+          <p:cNvSpPr>
+            <a:spLocks noGrp="1"/>
+          </p:cNvSpPr>
+          <p:nvPr>
+            <p:ph type="title"/>
+          </p:nvPr>
+        </p:nvSpPr>
+        <p:spPr/>
+        <p:txBody>
+          <a:bodyPr/>
+          <a:lstStyle/>
+          <a:p>
+            <a:r>
+              <a:rPr lang="en-US" dirty="0" smtClean="0"/>
+              <a:t>Thank YOU</a:t>
+            </a:r>
+            <a:endParaRPr lang="en-US" dirty="0"/>
+          </a:p>
+        </p:txBody>
+      </p:sp>
+      <p:pic>
+        <p:nvPicPr>
+          <p:cNvPr id="7" name="Content Placeholder 6"/>
+          <p:cNvPicPr>
+            <a:picLocks noGrp="1" noChangeAspect="1"/>
+          </p:cNvPicPr>
+          <p:nvPr>
+            <p:ph idx="1"/>
+          </p:nvPr>
+        </p:nvPicPr>
+        <p:blipFill>
+          <a:blip r:embed="rId2">
+            <a:extLst>
+              <a:ext uri="{28A0092B-C50C-407E-A947-70E740481C1C}">
+                <a14:useLocalDpi xmlns:a14="http://schemas.microsoft.com/office/drawing/2010/main" val="0"/>
+              </a:ext>
+            </a:extLst>
+          </a:blip>
+          <a:stretch>
+            <a:fillRect/>
+          </a:stretch>
+        </p:blipFill>
+        <p:spPr>
+          <a:xfrm>
+            <a:off x="3938614" y="2590800"/>
+            <a:ext cx="4369726" cy="2467610"/>
+          </a:xfrm>
+        </p:spPr>
+      </p:pic>
+    </p:spTree>
+    <p:extLst>
+      <p:ext uri="{BB962C8B-B14F-4D97-AF65-F5344CB8AC3E}">
+        <p14:creationId xmlns:p14="http://schemas.microsoft.com/office/powerpoint/2010/main" val="2199189934"/>
+      </p:ext>
+    </p:extLst>
+  </p:cSld>
+  <p:clrMapOvr>
+    <a:masterClrMapping/>
+  </p:clrMapOvr>
+  <p:timing>
+    <p:tnLst>
+      <p:par>
+        <p:cTn id="1" dur="indefinite" restart="never" nodeType="tmRoot"/>
+      </p:par>
+    </p:tnLst>
+  </p:timing>
 </p:sld>
 </file>
 
@@ -9759,6 +12807,13 @@
   <p:clrMapOvr>
     <a:masterClrMapping/>
   </p:clrMapOvr>
+  <p:timing>
+    <p:tnLst>
+      <p:par>
+        <p:cTn id="1" dur="indefinite" restart="never" nodeType="tmRoot"/>
+      </p:par>
+    </p:tnLst>
+  </p:timing>
 </p:sld>
 </file>
 
@@ -9837,6 +12892,13 @@
   <p:clrMapOvr>
     <a:masterClrMapping/>
   </p:clrMapOvr>
+  <p:timing>
+    <p:tnLst>
+      <p:par>
+        <p:cTn id="1" dur="indefinite" restart="never" nodeType="tmRoot"/>
+      </p:par>
+    </p:tnLst>
+  </p:timing>
 </p:sld>
 </file>
 
@@ -10015,6 +13077,13 @@
   <p:clrMapOvr>
     <a:masterClrMapping/>
   </p:clrMapOvr>
+  <p:timing>
+    <p:tnLst>
+      <p:par>
+        <p:cTn id="1" dur="indefinite" restart="never" nodeType="tmRoot"/>
+      </p:par>
+    </p:tnLst>
+  </p:timing>
 </p:sld>
 </file>
 
@@ -10248,6 +13317,13 @@
   <p:clrMapOvr>
     <a:masterClrMapping/>
   </p:clrMapOvr>
+  <p:timing>
+    <p:tnLst>
+      <p:par>
+        <p:cTn id="1" dur="indefinite" restart="never" nodeType="tmRoot"/>
+      </p:par>
+    </p:tnLst>
+  </p:timing>
 </p:sld>
 </file>
 
@@ -10390,6 +13466,13 @@
   <p:clrMapOvr>
     <a:masterClrMapping/>
   </p:clrMapOvr>
+  <p:timing>
+    <p:tnLst>
+      <p:par>
+        <p:cTn id="1" dur="indefinite" restart="never" nodeType="tmRoot"/>
+      </p:par>
+    </p:tnLst>
+  </p:timing>
 </p:sld>
 </file>
 
@@ -10476,6 +13559,275 @@
   <p:clrMapOvr>
     <a:masterClrMapping/>
   </p:clrMapOvr>
+  <p:timing>
+    <p:tnLst>
+      <p:par>
+        <p:cTn id="1" dur="indefinite" restart="never" nodeType="tmRoot"/>
+      </p:par>
+    </p:tnLst>
+  </p:timing>
+</p:sld>
+</file>
+
+<file path=ppt/slides/slide8.xml><?xml version="1.0" encoding="utf-8"?>
+<p:sld xmlns:a="http://schemas.openxmlformats.org/drawingml/2006/main" xmlns:r="http://schemas.openxmlformats.org/officeDocument/2006/relationships" xmlns:p="http://schemas.openxmlformats.org/presentationml/2006/main">
+  <p:cSld>
+    <p:spTree>
+      <p:nvGrpSpPr>
+        <p:cNvPr id="1" name=""/>
+        <p:cNvGrpSpPr/>
+        <p:nvPr/>
+      </p:nvGrpSpPr>
+      <p:grpSpPr>
+        <a:xfrm>
+          <a:off x="0" y="0"/>
+          <a:ext cx="0" cy="0"/>
+          <a:chOff x="0" y="0"/>
+          <a:chExt cx="0" cy="0"/>
+        </a:xfrm>
+      </p:grpSpPr>
+      <p:sp>
+        <p:nvSpPr>
+          <p:cNvPr id="2" name="Title 1"/>
+          <p:cNvSpPr>
+            <a:spLocks noGrp="1"/>
+          </p:cNvSpPr>
+          <p:nvPr>
+            <p:ph type="title"/>
+          </p:nvPr>
+        </p:nvSpPr>
+        <p:spPr/>
+        <p:txBody>
+          <a:bodyPr/>
+          <a:lstStyle/>
+          <a:p>
+            <a:r>
+              <a:rPr lang="en-US" dirty="0" smtClean="0"/>
+              <a:t>KEY CONCEPTS</a:t>
+            </a:r>
+            <a:endParaRPr lang="en-US" dirty="0"/>
+          </a:p>
+        </p:txBody>
+      </p:sp>
+      <p:graphicFrame>
+        <p:nvGraphicFramePr>
+          <p:cNvPr id="6" name="Content Placeholder 5"/>
+          <p:cNvGraphicFramePr>
+            <a:graphicFrameLocks noGrp="1"/>
+          </p:cNvGraphicFramePr>
+          <p:nvPr>
+            <p:ph idx="1"/>
+            <p:extLst>
+              <p:ext uri="{D42A27DB-BD31-4B8C-83A1-F6EECF244321}">
+                <p14:modId xmlns:p14="http://schemas.microsoft.com/office/powerpoint/2010/main" val="3731443858"/>
+              </p:ext>
+            </p:extLst>
+          </p:nvPr>
+        </p:nvGraphicFramePr>
+        <p:xfrm>
+          <a:off x="1250950" y="2286000"/>
+          <a:ext cx="10179050" cy="3594100"/>
+        </p:xfrm>
+        <a:graphic>
+          <a:graphicData uri="http://schemas.openxmlformats.org/drawingml/2006/diagram">
+            <dgm:relIds xmlns:dgm="http://schemas.openxmlformats.org/drawingml/2006/diagram" xmlns:r="http://schemas.openxmlformats.org/officeDocument/2006/relationships" r:dm="rId2" r:lo="rId3" r:qs="rId4" r:cs="rId5"/>
+          </a:graphicData>
+        </a:graphic>
+      </p:graphicFrame>
+    </p:spTree>
+    <p:extLst>
+      <p:ext uri="{BB962C8B-B14F-4D97-AF65-F5344CB8AC3E}">
+        <p14:creationId xmlns:p14="http://schemas.microsoft.com/office/powerpoint/2010/main" val="3390104539"/>
+      </p:ext>
+    </p:extLst>
+  </p:cSld>
+  <p:clrMapOvr>
+    <a:masterClrMapping/>
+  </p:clrMapOvr>
+  <p:timing>
+    <p:tnLst>
+      <p:par>
+        <p:cTn id="1" dur="indefinite" restart="never" nodeType="tmRoot"/>
+      </p:par>
+    </p:tnLst>
+  </p:timing>
+</p:sld>
+</file>
+
+<file path=ppt/slides/slide9.xml><?xml version="1.0" encoding="utf-8"?>
+<p:sld xmlns:a="http://schemas.openxmlformats.org/drawingml/2006/main" xmlns:r="http://schemas.openxmlformats.org/officeDocument/2006/relationships" xmlns:p="http://schemas.openxmlformats.org/presentationml/2006/main">
+  <p:cSld>
+    <p:spTree>
+      <p:nvGrpSpPr>
+        <p:cNvPr id="1" name=""/>
+        <p:cNvGrpSpPr/>
+        <p:nvPr/>
+      </p:nvGrpSpPr>
+      <p:grpSpPr>
+        <a:xfrm>
+          <a:off x="0" y="0"/>
+          <a:ext cx="0" cy="0"/>
+          <a:chOff x="0" y="0"/>
+          <a:chExt cx="0" cy="0"/>
+        </a:xfrm>
+      </p:grpSpPr>
+      <p:sp>
+        <p:nvSpPr>
+          <p:cNvPr id="2" name="Title 1"/>
+          <p:cNvSpPr>
+            <a:spLocks noGrp="1"/>
+          </p:cNvSpPr>
+          <p:nvPr>
+            <p:ph type="title"/>
+          </p:nvPr>
+        </p:nvSpPr>
+        <p:spPr/>
+        <p:txBody>
+          <a:bodyPr/>
+          <a:lstStyle/>
+          <a:p>
+            <a:r>
+              <a:rPr lang="en-US" dirty="0" smtClean="0"/>
+              <a:t>Further Reading</a:t>
+            </a:r>
+            <a:endParaRPr lang="en-US" dirty="0"/>
+          </a:p>
+        </p:txBody>
+      </p:sp>
+      <p:sp>
+        <p:nvSpPr>
+          <p:cNvPr id="3" name="Content Placeholder 2"/>
+          <p:cNvSpPr>
+            <a:spLocks noGrp="1"/>
+          </p:cNvSpPr>
+          <p:nvPr>
+            <p:ph idx="1"/>
+          </p:nvPr>
+        </p:nvSpPr>
+        <p:spPr/>
+        <p:txBody>
+          <a:bodyPr/>
+          <a:lstStyle/>
+          <a:p>
+            <a:r>
+              <a:rPr lang="en-US" dirty="0"/>
+              <a:t>Official documentation: </a:t>
+            </a:r>
+            <a:r>
+              <a:rPr lang="en-US" dirty="0">
+                <a:hlinkClick r:id="rId2"/>
+              </a:rPr>
+              <a:t>https://</a:t>
+            </a:r>
+            <a:r>
+              <a:rPr lang="en-US" dirty="0" smtClean="0">
+                <a:hlinkClick r:id="rId2"/>
+              </a:rPr>
+              <a:t>webpack.js.org</a:t>
+            </a:r>
+            <a:endParaRPr lang="en-US" dirty="0" smtClean="0"/>
+          </a:p>
+          <a:p>
+            <a:r>
+              <a:rPr lang="en-US" dirty="0"/>
+              <a:t>For curious: </a:t>
+            </a:r>
+            <a:r>
+              <a:rPr lang="en-US" dirty="0">
+                <a:hlinkClick r:id="rId3"/>
+              </a:rPr>
+              <a:t>https://</a:t>
+            </a:r>
+            <a:r>
+              <a:rPr lang="en-US" dirty="0" smtClean="0">
+                <a:hlinkClick r:id="rId3"/>
+              </a:rPr>
+              <a:t>github.com/sindresorhus/awesome</a:t>
+            </a:r>
+            <a:endParaRPr lang="en-US" dirty="0" smtClean="0"/>
+          </a:p>
+          <a:p>
+            <a:r>
+              <a:rPr lang="en-US" dirty="0" smtClean="0"/>
+              <a:t>For curious in </a:t>
+            </a:r>
+            <a:r>
+              <a:rPr lang="en-US" dirty="0" err="1" smtClean="0"/>
+              <a:t>WebPack</a:t>
+            </a:r>
+            <a:r>
+              <a:rPr lang="en-US" dirty="0" smtClean="0"/>
+              <a:t>: </a:t>
+            </a:r>
+            <a:r>
+              <a:rPr lang="en-US" dirty="0">
+                <a:hlinkClick r:id="rId4"/>
+              </a:rPr>
+              <a:t>https://</a:t>
+            </a:r>
+            <a:r>
+              <a:rPr lang="en-US" dirty="0" smtClean="0">
+                <a:hlinkClick r:id="rId4"/>
+              </a:rPr>
+              <a:t>github.com/webpack-contrib/awesome-webpack</a:t>
+            </a:r>
+            <a:endParaRPr lang="en-US" dirty="0" smtClean="0"/>
+          </a:p>
+          <a:p>
+            <a:r>
+              <a:rPr lang="en-US" dirty="0" smtClean="0"/>
+              <a:t>Build your Angular2+ app with </a:t>
+            </a:r>
+            <a:r>
+              <a:rPr lang="en-US" dirty="0" err="1" smtClean="0"/>
+              <a:t>AngularCLI</a:t>
+            </a:r>
+            <a:r>
+              <a:rPr lang="en-US" dirty="0"/>
+              <a:t>: </a:t>
+            </a:r>
+            <a:r>
+              <a:rPr lang="en-US" dirty="0">
+                <a:hlinkClick r:id="rId5"/>
+              </a:rPr>
+              <a:t>https://</a:t>
+            </a:r>
+            <a:r>
+              <a:rPr lang="en-US" dirty="0" smtClean="0">
+                <a:hlinkClick r:id="rId5"/>
+              </a:rPr>
+              <a:t>cli.angular.io</a:t>
+            </a:r>
+            <a:endParaRPr lang="en-US" dirty="0" smtClean="0"/>
+          </a:p>
+          <a:p>
+            <a:pPr marL="0" indent="0">
+              <a:buNone/>
+            </a:pPr>
+            <a:endParaRPr lang="en-US" dirty="0" smtClean="0"/>
+          </a:p>
+          <a:p>
+            <a:endParaRPr lang="en-US" dirty="0"/>
+          </a:p>
+        </p:txBody>
+      </p:sp>
+    </p:spTree>
+    <p:extLst>
+      <p:ext uri="{BB962C8B-B14F-4D97-AF65-F5344CB8AC3E}">
+        <p14:creationId xmlns:p14="http://schemas.microsoft.com/office/powerpoint/2010/main" val="645069605"/>
+      </p:ext>
+    </p:extLst>
+  </p:cSld>
+  <p:clrMapOvr>
+    <a:masterClrMapping/>
+  </p:clrMapOvr>
+  <p:timing>
+    <p:tnLst>
+      <p:par>
+        <p:cTn id="1" dur="indefinite" restart="never" nodeType="tmRoot"/>
+      </p:par>
+    </p:tnLst>
+  </p:timing>
 </p:sld>
 </file>
 

</xml_diff>